<commit_message>
Udpated figs and scenarios
</commit_message>
<xml_diff>
--- a/figs/screenshot_diagrams.pptx
+++ b/figs/screenshot_diagrams.pptx
@@ -11,6 +11,7 @@
     <p:sldId id="260" r:id="rId5"/>
     <p:sldId id="261" r:id="rId6"/>
     <p:sldId id="262" r:id="rId7"/>
+    <p:sldId id="263" r:id="rId8"/>
   </p:sldIdLst>
   <p:sldSz cx="9144000" cy="6858000" type="screen4x3"/>
   <p:notesSz cx="6858000" cy="9144000"/>
@@ -10401,53 +10402,186 @@
           <a:chExt cx="0" cy="0"/>
         </a:xfrm>
       </p:grpSpPr>
-      <p:pic>
-        <p:nvPicPr>
-          <p:cNvPr id="4" name="Picture 3"/>
-          <p:cNvPicPr>
-            <a:picLocks noChangeAspect="1"/>
-          </p:cNvPicPr>
+      <p:sp>
+        <p:nvSpPr>
+          <p:cNvPr id="3" name="Rectangle 2"/>
+          <p:cNvSpPr/>
           <p:nvPr/>
-        </p:nvPicPr>
-        <p:blipFill rotWithShape="1">
-          <a:blip r:embed="rId2"/>
-          <a:srcRect r="52532" b="28793"/>
-          <a:stretch/>
-        </p:blipFill>
+        </p:nvSpPr>
         <p:spPr>
           <a:xfrm>
-            <a:off x="676766" y="1522822"/>
-            <a:ext cx="7377782" cy="3808960"/>
+            <a:off x="1604107" y="2340013"/>
+            <a:ext cx="4443047" cy="2818141"/>
           </a:xfrm>
           <a:prstGeom prst="rect">
             <a:avLst/>
           </a:prstGeom>
+          <a:solidFill>
+            <a:schemeClr val="bg1"/>
+          </a:solidFill>
+          <a:ln>
+            <a:noFill/>
+          </a:ln>
+          <a:effectLst/>
         </p:spPr>
-      </p:pic>
-      <p:pic>
-        <p:nvPicPr>
-          <p:cNvPr id="2" name="Picture 1"/>
-          <p:cNvPicPr>
-            <a:picLocks noChangeAspect="1"/>
-          </p:cNvPicPr>
+        <p:style>
+          <a:lnRef idx="1">
+            <a:schemeClr val="accent1"/>
+          </a:lnRef>
+          <a:fillRef idx="3">
+            <a:schemeClr val="accent1"/>
+          </a:fillRef>
+          <a:effectRef idx="2">
+            <a:schemeClr val="accent1"/>
+          </a:effectRef>
+          <a:fontRef idx="minor">
+            <a:schemeClr val="lt1"/>
+          </a:fontRef>
+        </p:style>
+        <p:txBody>
+          <a:bodyPr rtlCol="0" anchor="ctr"/>
+          <a:lstStyle/>
+          <a:p>
+            <a:pPr algn="ctr"/>
+            <a:endParaRPr lang="en-US"/>
+          </a:p>
+        </p:txBody>
+      </p:sp>
+      <p:grpSp>
+        <p:nvGrpSpPr>
+          <p:cNvPr id="9" name="Group 8"/>
+          <p:cNvGrpSpPr/>
           <p:nvPr/>
-        </p:nvPicPr>
-        <p:blipFill>
-          <a:blip r:embed="rId3"/>
-          <a:stretch>
-            <a:fillRect/>
-          </a:stretch>
-        </p:blipFill>
-        <p:spPr>
+        </p:nvGrpSpPr>
+        <p:grpSpPr>
           <a:xfrm>
-            <a:off x="763505" y="2353863"/>
-            <a:ext cx="5982519" cy="2899716"/>
+            <a:off x="1176215" y="1039446"/>
+            <a:ext cx="6648792" cy="3581584"/>
+            <a:chOff x="1176215" y="1039446"/>
+            <a:chExt cx="6648792" cy="3581584"/>
           </a:xfrm>
-          <a:prstGeom prst="rect">
-            <a:avLst/>
-          </a:prstGeom>
-        </p:spPr>
-      </p:pic>
+        </p:grpSpPr>
+        <p:pic>
+          <p:nvPicPr>
+            <p:cNvPr id="6" name="Picture 5"/>
+            <p:cNvPicPr>
+              <a:picLocks noChangeAspect="1"/>
+            </p:cNvPicPr>
+            <p:nvPr/>
+          </p:nvPicPr>
+          <p:blipFill>
+            <a:blip r:embed="rId2"/>
+            <a:stretch>
+              <a:fillRect/>
+            </a:stretch>
+          </p:blipFill>
+          <p:spPr>
+            <a:xfrm>
+              <a:off x="1176215" y="1039446"/>
+              <a:ext cx="6648792" cy="3581584"/>
+            </a:xfrm>
+            <a:prstGeom prst="rect">
+              <a:avLst/>
+            </a:prstGeom>
+          </p:spPr>
+        </p:pic>
+        <p:sp>
+          <p:nvSpPr>
+            <p:cNvPr id="7" name="TextBox 6"/>
+            <p:cNvSpPr txBox="1"/>
+            <p:nvPr/>
+          </p:nvSpPr>
+          <p:spPr>
+            <a:xfrm>
+              <a:off x="2344615" y="1651003"/>
+              <a:ext cx="3970859" cy="923330"/>
+            </a:xfrm>
+            <a:prstGeom prst="rect">
+              <a:avLst/>
+            </a:prstGeom>
+            <a:noFill/>
+          </p:spPr>
+          <p:txBody>
+            <a:bodyPr wrap="none" rtlCol="0">
+              <a:spAutoFit/>
+            </a:bodyPr>
+            <a:lstStyle/>
+            <a:p>
+              <a:r>
+                <a:rPr lang="en-US" dirty="0" err="1" smtClean="0">
+                  <a:latin typeface="Courier New"/>
+                  <a:cs typeface="Courier New"/>
+                </a:rPr>
+                <a:t>SimilarityJoin</a:t>
+              </a:r>
+              <a:r>
+                <a:rPr lang="en-US" dirty="0" smtClean="0">
+                  <a:latin typeface="Courier New"/>
+                  <a:cs typeface="Courier New"/>
+                </a:rPr>
+                <a:t> </a:t>
+              </a:r>
+            </a:p>
+            <a:p>
+              <a:r>
+                <a:rPr lang="en-US" b="1" dirty="0">
+                  <a:latin typeface="Courier New"/>
+                  <a:cs typeface="Courier New"/>
+                </a:rPr>
+                <a:t>	</a:t>
+              </a:r>
+              <a:r>
+                <a:rPr lang="en-US" b="1" dirty="0" smtClean="0">
+                  <a:latin typeface="Courier New"/>
+                  <a:cs typeface="Courier New"/>
+                </a:rPr>
+                <a:t>ON</a:t>
+              </a:r>
+              <a:r>
+                <a:rPr lang="en-US" dirty="0" smtClean="0">
+                  <a:latin typeface="Courier New"/>
+                  <a:cs typeface="Courier New"/>
+                </a:rPr>
+                <a:t> (Yelp, Yelp)</a:t>
+              </a:r>
+            </a:p>
+            <a:p>
+              <a:r>
+                <a:rPr lang="en-US" b="1" dirty="0" smtClean="0">
+                  <a:latin typeface="Courier New"/>
+                  <a:cs typeface="Courier New"/>
+                </a:rPr>
+                <a:t>	WITH</a:t>
+              </a:r>
+              <a:r>
+                <a:rPr lang="en-US" dirty="0" smtClean="0">
+                  <a:latin typeface="Courier New"/>
+                  <a:cs typeface="Courier New"/>
+                </a:rPr>
+                <a:t> </a:t>
+              </a:r>
+              <a:r>
+                <a:rPr lang="en-US" dirty="0" err="1" smtClean="0">
+                  <a:latin typeface="Courier New"/>
+                  <a:cs typeface="Courier New"/>
+                </a:rPr>
+                <a:t>Jaccard</a:t>
+              </a:r>
+              <a:r>
+                <a:rPr lang="en-US" dirty="0" smtClean="0">
+                  <a:latin typeface="Courier New"/>
+                  <a:cs typeface="Courier New"/>
+                </a:rPr>
+                <a:t>, thresh=0.8</a:t>
+              </a:r>
+              <a:endParaRPr lang="en-US" dirty="0">
+                <a:latin typeface="Courier New"/>
+                <a:cs typeface="Courier New"/>
+              </a:endParaRPr>
+            </a:p>
+          </p:txBody>
+        </p:sp>
+      </p:grpSp>
     </p:spTree>
     <p:extLst>
       <p:ext uri="{BB962C8B-B14F-4D97-AF65-F5344CB8AC3E}">
@@ -10526,36 +10660,6 @@
           </a:p>
         </p:txBody>
       </p:sp>
-      <p:pic>
-        <p:nvPicPr>
-          <p:cNvPr id="5" name="Picture 4"/>
-          <p:cNvPicPr>
-            <a:picLocks noChangeAspect="1"/>
-          </p:cNvPicPr>
-          <p:nvPr/>
-        </p:nvPicPr>
-        <p:blipFill rotWithShape="1">
-          <a:blip r:embed="rId2"/>
-          <a:srcRect l="1533" t="4682" r="19423" b="7938"/>
-          <a:stretch/>
-        </p:blipFill>
-        <p:spPr>
-          <a:xfrm>
-            <a:off x="639704" y="1947333"/>
-            <a:ext cx="3752876" cy="2145605"/>
-          </a:xfrm>
-          <a:prstGeom prst="rect">
-            <a:avLst/>
-          </a:prstGeom>
-          <a:ln>
-            <a:solidFill>
-              <a:schemeClr val="bg1">
-                <a:lumMod val="75000"/>
-              </a:schemeClr>
-            </a:solidFill>
-          </a:ln>
-        </p:spPr>
-      </p:pic>
       <p:cxnSp>
         <p:nvCxnSpPr>
           <p:cNvPr id="6" name="Straight Arrow Connector 5"/>
@@ -11030,33 +11134,7 @@
                           <a:latin typeface="Gill Sans"/>
                           <a:cs typeface="Gill Sans"/>
                         </a:rPr>
-                        <a:t> </a:t>
-                      </a:r>
-                      <a:r>
-                        <a:rPr lang="en-US" sz="1200" b="0" baseline="0" dirty="0" smtClean="0">
-                          <a:solidFill>
-                            <a:schemeClr val="tx1">
-                              <a:lumMod val="95000"/>
-                              <a:lumOff val="5000"/>
-                            </a:schemeClr>
-                          </a:solidFill>
-                          <a:latin typeface="Gill Sans"/>
-                          <a:cs typeface="Gill Sans"/>
-                        </a:rPr>
-                        <a:t>E Hayward</a:t>
-                      </a:r>
-                      <a:r>
-                        <a:rPr lang="en-US" sz="1200" b="0" baseline="0" dirty="0" smtClean="0">
-                          <a:solidFill>
-                            <a:schemeClr val="tx1">
-                              <a:lumMod val="95000"/>
-                              <a:lumOff val="5000"/>
-                            </a:schemeClr>
-                          </a:solidFill>
-                          <a:latin typeface="Gill Sans"/>
-                          <a:cs typeface="Gill Sans"/>
-                        </a:rPr>
-                        <a:t>.</a:t>
+                        <a:t> E Hayward.</a:t>
                       </a:r>
                       <a:endParaRPr lang="en-US" sz="1200" b="0" dirty="0">
                         <a:solidFill>
@@ -11501,20 +11579,7 @@
                           <a:latin typeface="Gill Sans"/>
                           <a:cs typeface="Gill Sans"/>
                         </a:rPr>
-                        <a:t>192 Courtyard </a:t>
-                      </a:r>
-                      <a:r>
-                        <a:rPr lang="en-US" sz="1200" b="0" dirty="0" smtClean="0">
-                          <a:solidFill>
-                            <a:schemeClr val="tx1">
-                              <a:lumMod val="95000"/>
-                              <a:lumOff val="5000"/>
-                            </a:schemeClr>
-                          </a:solidFill>
-                          <a:latin typeface="Gill Sans"/>
-                          <a:cs typeface="Gill Sans"/>
-                        </a:rPr>
-                        <a:t>W..</a:t>
+                        <a:t>192 Courtyard W..</a:t>
                       </a:r>
                       <a:endParaRPr lang="en-US" sz="1200" b="0" dirty="0">
                         <a:solidFill>
@@ -11624,6 +11689,29 @@
           </a:p>
         </p:txBody>
       </p:sp>
+      <p:pic>
+        <p:nvPicPr>
+          <p:cNvPr id="4" name="Picture 3"/>
+          <p:cNvPicPr>
+            <a:picLocks noChangeAspect="1"/>
+          </p:cNvPicPr>
+          <p:nvPr/>
+        </p:nvPicPr>
+        <p:blipFill rotWithShape="1">
+          <a:blip r:embed="rId2"/>
+          <a:srcRect l="-2450" r="2450"/>
+          <a:stretch/>
+        </p:blipFill>
+        <p:spPr>
+          <a:xfrm>
+            <a:off x="183896" y="1836179"/>
+            <a:ext cx="4293941" cy="2256759"/>
+          </a:xfrm>
+          <a:prstGeom prst="rect">
+            <a:avLst/>
+          </a:prstGeom>
+        </p:spPr>
+      </p:pic>
     </p:spTree>
     <p:extLst>
       <p:ext uri="{BB962C8B-B14F-4D97-AF65-F5344CB8AC3E}">
@@ -11654,57 +11742,1087 @@
           <a:chExt cx="0" cy="0"/>
         </a:xfrm>
       </p:grpSpPr>
-      <p:pic>
-        <p:nvPicPr>
-          <p:cNvPr id="5" name="Picture 4"/>
-          <p:cNvPicPr>
-            <a:picLocks noChangeAspect="1"/>
-          </p:cNvPicPr>
+      <p:grpSp>
+        <p:nvGrpSpPr>
+          <p:cNvPr id="2" name="Group 1"/>
+          <p:cNvGrpSpPr/>
           <p:nvPr/>
-        </p:nvPicPr>
-        <p:blipFill rotWithShape="1">
-          <a:blip r:embed="rId2"/>
-          <a:srcRect l="1533" t="4682" r="19423" b="7938"/>
-          <a:stretch/>
-        </p:blipFill>
-        <p:spPr>
+        </p:nvGrpSpPr>
+        <p:grpSpPr>
           <a:xfrm>
-            <a:off x="639704" y="1947333"/>
-            <a:ext cx="3752876" cy="2145605"/>
+            <a:off x="639704" y="1439122"/>
+            <a:ext cx="6401503" cy="2653817"/>
+            <a:chOff x="639704" y="1439122"/>
+            <a:chExt cx="6401503" cy="2653817"/>
           </a:xfrm>
-          <a:prstGeom prst="rect">
-            <a:avLst/>
-          </a:prstGeom>
-          <a:ln>
+        </p:grpSpPr>
+        <p:pic>
+          <p:nvPicPr>
+            <p:cNvPr id="5" name="Picture 4"/>
+            <p:cNvPicPr>
+              <a:picLocks noChangeAspect="1"/>
+            </p:cNvPicPr>
+            <p:nvPr/>
+          </p:nvPicPr>
+          <p:blipFill rotWithShape="1">
+            <a:blip r:embed="rId2"/>
+            <a:srcRect l="1533" t="4682" r="19423" b="7938"/>
+            <a:stretch/>
+          </p:blipFill>
+          <p:spPr>
+            <a:xfrm>
+              <a:off x="639704" y="1947333"/>
+              <a:ext cx="3752876" cy="2145605"/>
+            </a:xfrm>
+            <a:prstGeom prst="rect">
+              <a:avLst/>
+            </a:prstGeom>
+            <a:ln>
+              <a:solidFill>
+                <a:schemeClr val="bg1">
+                  <a:lumMod val="75000"/>
+                </a:schemeClr>
+              </a:solidFill>
+            </a:ln>
+          </p:spPr>
+        </p:pic>
+        <p:sp>
+          <p:nvSpPr>
+            <p:cNvPr id="6" name="Rectangle 5"/>
+            <p:cNvSpPr/>
+            <p:nvPr/>
+          </p:nvSpPr>
+          <p:spPr>
+            <a:xfrm>
+              <a:off x="639704" y="1947333"/>
+              <a:ext cx="3752876" cy="2145605"/>
+            </a:xfrm>
+            <a:prstGeom prst="rect">
+              <a:avLst/>
+            </a:prstGeom>
+            <a:solidFill>
+              <a:schemeClr val="bg1"/>
+            </a:solidFill>
+            <a:ln>
+              <a:solidFill>
+                <a:srgbClr val="BFBFBF"/>
+              </a:solidFill>
+            </a:ln>
+            <a:effectLst/>
+          </p:spPr>
+          <p:style>
+            <a:lnRef idx="1">
+              <a:schemeClr val="accent1"/>
+            </a:lnRef>
+            <a:fillRef idx="3">
+              <a:schemeClr val="accent1"/>
+            </a:fillRef>
+            <a:effectRef idx="2">
+              <a:schemeClr val="accent1"/>
+            </a:effectRef>
+            <a:fontRef idx="minor">
+              <a:schemeClr val="lt1"/>
+            </a:fontRef>
+          </p:style>
+          <p:txBody>
+            <a:bodyPr rtlCol="0" anchor="ctr"/>
+            <a:lstStyle/>
+            <a:p>
+              <a:pPr algn="ctr"/>
+              <a:endParaRPr lang="en-US">
+                <a:latin typeface="Gill Sans"/>
+                <a:cs typeface="Gill Sans"/>
+              </a:endParaRPr>
+            </a:p>
+          </p:txBody>
+        </p:sp>
+        <p:sp>
+          <p:nvSpPr>
+            <p:cNvPr id="9" name="Rectangle 8"/>
+            <p:cNvSpPr/>
+            <p:nvPr/>
+          </p:nvSpPr>
+          <p:spPr>
+            <a:xfrm>
+              <a:off x="2344413" y="2539994"/>
+              <a:ext cx="1531806" cy="325559"/>
+            </a:xfrm>
+            <a:prstGeom prst="rect">
+              <a:avLst/>
+            </a:prstGeom>
+            <a:solidFill>
+              <a:schemeClr val="bg1"/>
+            </a:solidFill>
+            <a:ln>
+              <a:solidFill>
+                <a:schemeClr val="bg1">
+                  <a:lumMod val="50000"/>
+                </a:schemeClr>
+              </a:solidFill>
+            </a:ln>
+            <a:effectLst/>
+          </p:spPr>
+          <p:style>
+            <a:lnRef idx="1">
+              <a:schemeClr val="accent1"/>
+            </a:lnRef>
+            <a:fillRef idx="3">
+              <a:schemeClr val="accent1"/>
+            </a:fillRef>
+            <a:effectRef idx="2">
+              <a:schemeClr val="accent1"/>
+            </a:effectRef>
+            <a:fontRef idx="minor">
+              <a:schemeClr val="lt1"/>
+            </a:fontRef>
+          </p:style>
+          <p:txBody>
+            <a:bodyPr rtlCol="0" anchor="ctr"/>
+            <a:lstStyle/>
+            <a:p>
+              <a:pPr algn="ctr"/>
+              <a:r>
+                <a:rPr lang="en-US" sz="1600" dirty="0" err="1" smtClean="0">
+                  <a:solidFill>
+                    <a:schemeClr val="tx1">
+                      <a:lumMod val="75000"/>
+                      <a:lumOff val="25000"/>
+                    </a:schemeClr>
+                  </a:solidFill>
+                  <a:latin typeface="Gill Sans"/>
+                  <a:cs typeface="Gill Sans"/>
+                </a:rPr>
+                <a:t>Jaccard</a:t>
+              </a:r>
+              <a:endParaRPr lang="en-US" sz="1600" dirty="0">
+                <a:solidFill>
+                  <a:schemeClr val="tx1">
+                    <a:lumMod val="75000"/>
+                    <a:lumOff val="25000"/>
+                  </a:schemeClr>
+                </a:solidFill>
+                <a:latin typeface="Gill Sans"/>
+                <a:cs typeface="Gill Sans"/>
+              </a:endParaRPr>
+            </a:p>
+          </p:txBody>
+        </p:sp>
+        <p:sp>
+          <p:nvSpPr>
+            <p:cNvPr id="10" name="Rectangle 9"/>
+            <p:cNvSpPr/>
+            <p:nvPr/>
+          </p:nvSpPr>
+          <p:spPr>
+            <a:xfrm>
+              <a:off x="3876219" y="2541708"/>
+              <a:ext cx="312325" cy="325559"/>
+            </a:xfrm>
+            <a:prstGeom prst="rect">
+              <a:avLst/>
+            </a:prstGeom>
+            <a:solidFill>
+              <a:schemeClr val="bg1"/>
+            </a:solidFill>
+            <a:ln>
+              <a:solidFill>
+                <a:schemeClr val="bg1">
+                  <a:lumMod val="50000"/>
+                </a:schemeClr>
+              </a:solidFill>
+            </a:ln>
+            <a:effectLst/>
+          </p:spPr>
+          <p:style>
+            <a:lnRef idx="1">
+              <a:schemeClr val="accent1"/>
+            </a:lnRef>
+            <a:fillRef idx="3">
+              <a:schemeClr val="accent1"/>
+            </a:fillRef>
+            <a:effectRef idx="2">
+              <a:schemeClr val="accent1"/>
+            </a:effectRef>
+            <a:fontRef idx="minor">
+              <a:schemeClr val="lt1"/>
+            </a:fontRef>
+          </p:style>
+          <p:txBody>
+            <a:bodyPr rtlCol="0" anchor="ctr"/>
+            <a:lstStyle/>
+            <a:p>
+              <a:pPr algn="ctr"/>
+              <a:endParaRPr lang="en-US" sz="1600">
+                <a:latin typeface="Gill Sans"/>
+                <a:cs typeface="Gill Sans"/>
+              </a:endParaRPr>
+            </a:p>
+          </p:txBody>
+        </p:sp>
+        <p:sp>
+          <p:nvSpPr>
+            <p:cNvPr id="11" name="Isosceles Triangle 10"/>
+            <p:cNvSpPr/>
+            <p:nvPr/>
+          </p:nvSpPr>
+          <p:spPr>
+            <a:xfrm rot="10800000">
+              <a:off x="3933874" y="2603256"/>
+              <a:ext cx="171652" cy="175388"/>
+            </a:xfrm>
+            <a:prstGeom prst="triangle">
+              <a:avLst/>
+            </a:prstGeom>
             <a:solidFill>
               <a:schemeClr val="bg1">
-                <a:lumMod val="75000"/>
+                <a:lumMod val="50000"/>
               </a:schemeClr>
             </a:solidFill>
-          </a:ln>
-        </p:spPr>
-      </p:pic>
+            <a:ln>
+              <a:solidFill>
+                <a:schemeClr val="bg1">
+                  <a:lumMod val="50000"/>
+                </a:schemeClr>
+              </a:solidFill>
+            </a:ln>
+            <a:effectLst/>
+          </p:spPr>
+          <p:style>
+            <a:lnRef idx="1">
+              <a:schemeClr val="accent1"/>
+            </a:lnRef>
+            <a:fillRef idx="3">
+              <a:schemeClr val="accent1"/>
+            </a:fillRef>
+            <a:effectRef idx="2">
+              <a:schemeClr val="accent1"/>
+            </a:effectRef>
+            <a:fontRef idx="minor">
+              <a:schemeClr val="lt1"/>
+            </a:fontRef>
+          </p:style>
+          <p:txBody>
+            <a:bodyPr rtlCol="0" anchor="ctr"/>
+            <a:lstStyle/>
+            <a:p>
+              <a:pPr algn="ctr"/>
+              <a:endParaRPr lang="en-US" sz="1600">
+                <a:latin typeface="Gill Sans"/>
+                <a:cs typeface="Gill Sans"/>
+              </a:endParaRPr>
+            </a:p>
+          </p:txBody>
+        </p:sp>
+        <p:sp>
+          <p:nvSpPr>
+            <p:cNvPr id="15" name="TextBox 14"/>
+            <p:cNvSpPr txBox="1"/>
+            <p:nvPr/>
+          </p:nvSpPr>
+          <p:spPr>
+            <a:xfrm>
+              <a:off x="734993" y="2496221"/>
+              <a:ext cx="1543061" cy="369332"/>
+            </a:xfrm>
+            <a:prstGeom prst="rect">
+              <a:avLst/>
+            </a:prstGeom>
+            <a:noFill/>
+          </p:spPr>
+          <p:txBody>
+            <a:bodyPr wrap="none" rtlCol="0">
+              <a:spAutoFit/>
+            </a:bodyPr>
+            <a:lstStyle/>
+            <a:p>
+              <a:r>
+                <a:rPr lang="en-US" dirty="0" smtClean="0">
+                  <a:latin typeface="Gill Sans"/>
+                  <a:cs typeface="Gill Sans"/>
+                </a:rPr>
+                <a:t>Similarity </a:t>
+              </a:r>
+              <a:r>
+                <a:rPr lang="en-US" dirty="0" err="1" smtClean="0">
+                  <a:latin typeface="Gill Sans"/>
+                  <a:cs typeface="Gill Sans"/>
+                </a:rPr>
+                <a:t>Func</a:t>
+              </a:r>
+              <a:endParaRPr lang="en-US" dirty="0" smtClean="0">
+                <a:latin typeface="Gill Sans"/>
+                <a:cs typeface="Gill Sans"/>
+              </a:endParaRPr>
+            </a:p>
+          </p:txBody>
+        </p:sp>
+        <p:sp>
+          <p:nvSpPr>
+            <p:cNvPr id="22" name="TextBox 21"/>
+            <p:cNvSpPr txBox="1"/>
+            <p:nvPr/>
+          </p:nvSpPr>
+          <p:spPr>
+            <a:xfrm>
+              <a:off x="1141317" y="3001069"/>
+              <a:ext cx="1136737" cy="369332"/>
+            </a:xfrm>
+            <a:prstGeom prst="rect">
+              <a:avLst/>
+            </a:prstGeom>
+            <a:noFill/>
+          </p:spPr>
+          <p:txBody>
+            <a:bodyPr wrap="none" rtlCol="0">
+              <a:spAutoFit/>
+            </a:bodyPr>
+            <a:lstStyle/>
+            <a:p>
+              <a:r>
+                <a:rPr lang="en-US" dirty="0" smtClean="0">
+                  <a:latin typeface="Gill Sans"/>
+                  <a:cs typeface="Gill Sans"/>
+                </a:rPr>
+                <a:t>Threshold</a:t>
+              </a:r>
+            </a:p>
+          </p:txBody>
+        </p:sp>
+        <p:sp>
+          <p:nvSpPr>
+            <p:cNvPr id="23" name="Rectangle 22"/>
+            <p:cNvSpPr/>
+            <p:nvPr/>
+          </p:nvSpPr>
+          <p:spPr>
+            <a:xfrm>
+              <a:off x="2344412" y="3500077"/>
+              <a:ext cx="1844131" cy="325559"/>
+            </a:xfrm>
+            <a:prstGeom prst="rect">
+              <a:avLst/>
+            </a:prstGeom>
+            <a:solidFill>
+              <a:schemeClr val="bg1"/>
+            </a:solidFill>
+            <a:ln>
+              <a:solidFill>
+                <a:schemeClr val="bg1">
+                  <a:lumMod val="50000"/>
+                </a:schemeClr>
+              </a:solidFill>
+            </a:ln>
+            <a:effectLst/>
+          </p:spPr>
+          <p:style>
+            <a:lnRef idx="1">
+              <a:schemeClr val="accent1"/>
+            </a:lnRef>
+            <a:fillRef idx="3">
+              <a:schemeClr val="accent1"/>
+            </a:fillRef>
+            <a:effectRef idx="2">
+              <a:schemeClr val="accent1"/>
+            </a:effectRef>
+            <a:fontRef idx="minor">
+              <a:schemeClr val="lt1"/>
+            </a:fontRef>
+          </p:style>
+          <p:txBody>
+            <a:bodyPr rtlCol="0" anchor="ctr"/>
+            <a:lstStyle/>
+            <a:p>
+              <a:pPr algn="ctr"/>
+              <a:r>
+                <a:rPr lang="en-US" sz="1600" dirty="0" smtClean="0">
+                  <a:solidFill>
+                    <a:schemeClr val="tx1">
+                      <a:lumMod val="75000"/>
+                      <a:lumOff val="25000"/>
+                    </a:schemeClr>
+                  </a:solidFill>
+                  <a:latin typeface="Gill Sans"/>
+                  <a:cs typeface="Gill Sans"/>
+                </a:rPr>
+                <a:t>\s+</a:t>
+              </a:r>
+              <a:endParaRPr lang="en-US" sz="1600" dirty="0">
+                <a:solidFill>
+                  <a:schemeClr val="tx1">
+                    <a:lumMod val="75000"/>
+                    <a:lumOff val="25000"/>
+                  </a:schemeClr>
+                </a:solidFill>
+                <a:latin typeface="Gill Sans"/>
+                <a:cs typeface="Gill Sans"/>
+              </a:endParaRPr>
+            </a:p>
+          </p:txBody>
+        </p:sp>
+        <p:sp>
+          <p:nvSpPr>
+            <p:cNvPr id="26" name="TextBox 25"/>
+            <p:cNvSpPr txBox="1"/>
+            <p:nvPr/>
+          </p:nvSpPr>
+          <p:spPr>
+            <a:xfrm>
+              <a:off x="1182682" y="3456304"/>
+              <a:ext cx="1095372" cy="369332"/>
+            </a:xfrm>
+            <a:prstGeom prst="rect">
+              <a:avLst/>
+            </a:prstGeom>
+            <a:noFill/>
+          </p:spPr>
+          <p:txBody>
+            <a:bodyPr wrap="none" rtlCol="0">
+              <a:spAutoFit/>
+            </a:bodyPr>
+            <a:lstStyle/>
+            <a:p>
+              <a:r>
+                <a:rPr lang="en-US" dirty="0" err="1" smtClean="0">
+                  <a:latin typeface="Gill Sans"/>
+                  <a:cs typeface="Gill Sans"/>
+                </a:rPr>
+                <a:t>Tokenizer</a:t>
+              </a:r>
+              <a:endParaRPr lang="en-US" dirty="0" smtClean="0">
+                <a:latin typeface="Gill Sans"/>
+                <a:cs typeface="Gill Sans"/>
+              </a:endParaRPr>
+            </a:p>
+          </p:txBody>
+        </p:sp>
+        <p:sp>
+          <p:nvSpPr>
+            <p:cNvPr id="27" name="Rectangle 26"/>
+            <p:cNvSpPr/>
+            <p:nvPr/>
+          </p:nvSpPr>
+          <p:spPr>
+            <a:xfrm>
+              <a:off x="2344413" y="2152657"/>
+              <a:ext cx="1531806" cy="325559"/>
+            </a:xfrm>
+            <a:prstGeom prst="rect">
+              <a:avLst/>
+            </a:prstGeom>
+            <a:solidFill>
+              <a:schemeClr val="bg1"/>
+            </a:solidFill>
+            <a:ln>
+              <a:solidFill>
+                <a:schemeClr val="bg1">
+                  <a:lumMod val="50000"/>
+                </a:schemeClr>
+              </a:solidFill>
+            </a:ln>
+            <a:effectLst/>
+          </p:spPr>
+          <p:style>
+            <a:lnRef idx="1">
+              <a:schemeClr val="accent1"/>
+            </a:lnRef>
+            <a:fillRef idx="3">
+              <a:schemeClr val="accent1"/>
+            </a:fillRef>
+            <a:effectRef idx="2">
+              <a:schemeClr val="accent1"/>
+            </a:effectRef>
+            <a:fontRef idx="minor">
+              <a:schemeClr val="lt1"/>
+            </a:fontRef>
+          </p:style>
+          <p:txBody>
+            <a:bodyPr rtlCol="0" anchor="ctr"/>
+            <a:lstStyle/>
+            <a:p>
+              <a:pPr algn="ctr"/>
+              <a:r>
+                <a:rPr lang="en-US" sz="1600" dirty="0" smtClean="0">
+                  <a:solidFill>
+                    <a:schemeClr val="tx1">
+                      <a:lumMod val="75000"/>
+                      <a:lumOff val="25000"/>
+                    </a:schemeClr>
+                  </a:solidFill>
+                  <a:latin typeface="Gill Sans"/>
+                  <a:cs typeface="Gill Sans"/>
+                </a:rPr>
+                <a:t>Broadcast</a:t>
+              </a:r>
+              <a:endParaRPr lang="en-US" sz="1600" dirty="0">
+                <a:solidFill>
+                  <a:schemeClr val="tx1">
+                    <a:lumMod val="75000"/>
+                    <a:lumOff val="25000"/>
+                  </a:schemeClr>
+                </a:solidFill>
+                <a:latin typeface="Gill Sans"/>
+                <a:cs typeface="Gill Sans"/>
+              </a:endParaRPr>
+            </a:p>
+          </p:txBody>
+        </p:sp>
+        <p:sp>
+          <p:nvSpPr>
+            <p:cNvPr id="28" name="Rectangle 27"/>
+            <p:cNvSpPr/>
+            <p:nvPr/>
+          </p:nvSpPr>
+          <p:spPr>
+            <a:xfrm>
+              <a:off x="3876219" y="2154371"/>
+              <a:ext cx="312325" cy="325559"/>
+            </a:xfrm>
+            <a:prstGeom prst="rect">
+              <a:avLst/>
+            </a:prstGeom>
+            <a:solidFill>
+              <a:schemeClr val="bg1"/>
+            </a:solidFill>
+            <a:ln>
+              <a:solidFill>
+                <a:schemeClr val="bg1">
+                  <a:lumMod val="50000"/>
+                </a:schemeClr>
+              </a:solidFill>
+            </a:ln>
+            <a:effectLst/>
+          </p:spPr>
+          <p:style>
+            <a:lnRef idx="1">
+              <a:schemeClr val="accent1"/>
+            </a:lnRef>
+            <a:fillRef idx="3">
+              <a:schemeClr val="accent1"/>
+            </a:fillRef>
+            <a:effectRef idx="2">
+              <a:schemeClr val="accent1"/>
+            </a:effectRef>
+            <a:fontRef idx="minor">
+              <a:schemeClr val="lt1"/>
+            </a:fontRef>
+          </p:style>
+          <p:txBody>
+            <a:bodyPr rtlCol="0" anchor="ctr"/>
+            <a:lstStyle/>
+            <a:p>
+              <a:pPr algn="ctr"/>
+              <a:endParaRPr lang="en-US" sz="1600">
+                <a:latin typeface="Gill Sans"/>
+                <a:cs typeface="Gill Sans"/>
+              </a:endParaRPr>
+            </a:p>
+          </p:txBody>
+        </p:sp>
+        <p:sp>
+          <p:nvSpPr>
+            <p:cNvPr id="29" name="Isosceles Triangle 28"/>
+            <p:cNvSpPr/>
+            <p:nvPr/>
+          </p:nvSpPr>
+          <p:spPr>
+            <a:xfrm rot="10800000">
+              <a:off x="3933874" y="2215919"/>
+              <a:ext cx="171652" cy="175388"/>
+            </a:xfrm>
+            <a:prstGeom prst="triangle">
+              <a:avLst/>
+            </a:prstGeom>
+            <a:solidFill>
+              <a:schemeClr val="bg1">
+                <a:lumMod val="50000"/>
+              </a:schemeClr>
+            </a:solidFill>
+            <a:ln>
+              <a:solidFill>
+                <a:schemeClr val="bg1">
+                  <a:lumMod val="50000"/>
+                </a:schemeClr>
+              </a:solidFill>
+            </a:ln>
+            <a:effectLst/>
+          </p:spPr>
+          <p:style>
+            <a:lnRef idx="1">
+              <a:schemeClr val="accent1"/>
+            </a:lnRef>
+            <a:fillRef idx="3">
+              <a:schemeClr val="accent1"/>
+            </a:fillRef>
+            <a:effectRef idx="2">
+              <a:schemeClr val="accent1"/>
+            </a:effectRef>
+            <a:fontRef idx="minor">
+              <a:schemeClr val="lt1"/>
+            </a:fontRef>
+          </p:style>
+          <p:txBody>
+            <a:bodyPr rtlCol="0" anchor="ctr"/>
+            <a:lstStyle/>
+            <a:p>
+              <a:pPr algn="ctr"/>
+              <a:endParaRPr lang="en-US" sz="1600">
+                <a:latin typeface="Gill Sans"/>
+                <a:cs typeface="Gill Sans"/>
+              </a:endParaRPr>
+            </a:p>
+          </p:txBody>
+        </p:sp>
+        <p:sp>
+          <p:nvSpPr>
+            <p:cNvPr id="30" name="TextBox 29"/>
+            <p:cNvSpPr txBox="1"/>
+            <p:nvPr/>
+          </p:nvSpPr>
+          <p:spPr>
+            <a:xfrm>
+              <a:off x="1254817" y="2108884"/>
+              <a:ext cx="1023237" cy="369332"/>
+            </a:xfrm>
+            <a:prstGeom prst="rect">
+              <a:avLst/>
+            </a:prstGeom>
+            <a:noFill/>
+          </p:spPr>
+          <p:txBody>
+            <a:bodyPr wrap="none" rtlCol="0">
+              <a:spAutoFit/>
+            </a:bodyPr>
+            <a:lstStyle/>
+            <a:p>
+              <a:r>
+                <a:rPr lang="en-US" dirty="0" smtClean="0">
+                  <a:latin typeface="Gill Sans"/>
+                  <a:cs typeface="Gill Sans"/>
+                </a:rPr>
+                <a:t>Join </a:t>
+              </a:r>
+              <a:r>
+                <a:rPr lang="en-US" dirty="0" err="1" smtClean="0">
+                  <a:latin typeface="Gill Sans"/>
+                  <a:cs typeface="Gill Sans"/>
+                </a:rPr>
+                <a:t>Impl</a:t>
+              </a:r>
+              <a:endParaRPr lang="en-US" dirty="0" smtClean="0">
+                <a:latin typeface="Gill Sans"/>
+                <a:cs typeface="Gill Sans"/>
+              </a:endParaRPr>
+            </a:p>
+          </p:txBody>
+        </p:sp>
+        <p:cxnSp>
+          <p:nvCxnSpPr>
+            <p:cNvPr id="32" name="Straight Connector 31"/>
+            <p:cNvCxnSpPr/>
+            <p:nvPr/>
+          </p:nvCxnSpPr>
+          <p:spPr>
+            <a:xfrm>
+              <a:off x="2734557" y="3225382"/>
+              <a:ext cx="1453987" cy="0"/>
+            </a:xfrm>
+            <a:prstGeom prst="line">
+              <a:avLst/>
+            </a:prstGeom>
+            <a:ln>
+              <a:solidFill>
+                <a:srgbClr val="7F7F7F"/>
+              </a:solidFill>
+              <a:headEnd type="none"/>
+              <a:tailEnd type="none"/>
+            </a:ln>
+            <a:effectLst/>
+          </p:spPr>
+          <p:style>
+            <a:lnRef idx="2">
+              <a:schemeClr val="accent1"/>
+            </a:lnRef>
+            <a:fillRef idx="0">
+              <a:schemeClr val="accent1"/>
+            </a:fillRef>
+            <a:effectRef idx="1">
+              <a:schemeClr val="accent1"/>
+            </a:effectRef>
+            <a:fontRef idx="minor">
+              <a:schemeClr val="tx1"/>
+            </a:fontRef>
+          </p:style>
+        </p:cxnSp>
+        <p:sp>
+          <p:nvSpPr>
+            <p:cNvPr id="33" name="Isosceles Triangle 32"/>
+            <p:cNvSpPr/>
+            <p:nvPr/>
+          </p:nvSpPr>
+          <p:spPr>
+            <a:xfrm>
+              <a:off x="3742130" y="3127532"/>
+              <a:ext cx="171652" cy="175388"/>
+            </a:xfrm>
+            <a:prstGeom prst="triangle">
+              <a:avLst/>
+            </a:prstGeom>
+            <a:solidFill>
+              <a:schemeClr val="bg1">
+                <a:lumMod val="50000"/>
+              </a:schemeClr>
+            </a:solidFill>
+            <a:ln>
+              <a:solidFill>
+                <a:schemeClr val="bg1">
+                  <a:lumMod val="50000"/>
+                </a:schemeClr>
+              </a:solidFill>
+            </a:ln>
+            <a:effectLst/>
+          </p:spPr>
+          <p:style>
+            <a:lnRef idx="1">
+              <a:schemeClr val="accent1"/>
+            </a:lnRef>
+            <a:fillRef idx="3">
+              <a:schemeClr val="accent1"/>
+            </a:fillRef>
+            <a:effectRef idx="2">
+              <a:schemeClr val="accent1"/>
+            </a:effectRef>
+            <a:fontRef idx="minor">
+              <a:schemeClr val="lt1"/>
+            </a:fontRef>
+          </p:style>
+          <p:txBody>
+            <a:bodyPr rtlCol="0" anchor="ctr"/>
+            <a:lstStyle/>
+            <a:p>
+              <a:pPr algn="ctr"/>
+              <a:endParaRPr lang="en-US" sz="1600">
+                <a:latin typeface="Gill Sans"/>
+                <a:cs typeface="Gill Sans"/>
+              </a:endParaRPr>
+            </a:p>
+          </p:txBody>
+        </p:sp>
+        <p:sp>
+          <p:nvSpPr>
+            <p:cNvPr id="34" name="TextBox 33"/>
+            <p:cNvSpPr txBox="1"/>
+            <p:nvPr/>
+          </p:nvSpPr>
+          <p:spPr>
+            <a:xfrm>
+              <a:off x="2281959" y="3013182"/>
+              <a:ext cx="479618" cy="369332"/>
+            </a:xfrm>
+            <a:prstGeom prst="rect">
+              <a:avLst/>
+            </a:prstGeom>
+            <a:noFill/>
+          </p:spPr>
+          <p:txBody>
+            <a:bodyPr wrap="none" rtlCol="0">
+              <a:spAutoFit/>
+            </a:bodyPr>
+            <a:lstStyle/>
+            <a:p>
+              <a:r>
+                <a:rPr lang="en-US" dirty="0" smtClean="0">
+                  <a:latin typeface="Gill Sans"/>
+                  <a:cs typeface="Gill Sans"/>
+                </a:rPr>
+                <a:t>0.8</a:t>
+              </a:r>
+              <a:endParaRPr lang="en-US" dirty="0">
+                <a:latin typeface="Gill Sans"/>
+                <a:cs typeface="Gill Sans"/>
+              </a:endParaRPr>
+            </a:p>
+          </p:txBody>
+        </p:sp>
+        <p:sp>
+          <p:nvSpPr>
+            <p:cNvPr id="36" name="TextBox 35"/>
+            <p:cNvSpPr txBox="1"/>
+            <p:nvPr/>
+          </p:nvSpPr>
+          <p:spPr>
+            <a:xfrm>
+              <a:off x="1209692" y="1460795"/>
+              <a:ext cx="1625741" cy="400110"/>
+            </a:xfrm>
+            <a:prstGeom prst="rect">
+              <a:avLst/>
+            </a:prstGeom>
+            <a:noFill/>
+          </p:spPr>
+          <p:txBody>
+            <a:bodyPr wrap="none" rtlCol="0">
+              <a:spAutoFit/>
+            </a:bodyPr>
+            <a:lstStyle/>
+            <a:p>
+              <a:r>
+                <a:rPr lang="en-US" sz="2000" dirty="0" smtClean="0">
+                  <a:latin typeface="Gill Sans"/>
+                  <a:cs typeface="Gill Sans"/>
+                </a:rPr>
+                <a:t>Similarity Join</a:t>
+              </a:r>
+              <a:endParaRPr lang="en-US" sz="2000" dirty="0">
+                <a:latin typeface="Gill Sans"/>
+                <a:cs typeface="Gill Sans"/>
+              </a:endParaRPr>
+            </a:p>
+          </p:txBody>
+        </p:sp>
+        <p:sp>
+          <p:nvSpPr>
+            <p:cNvPr id="37" name="Isosceles Triangle 36"/>
+            <p:cNvSpPr/>
+            <p:nvPr/>
+          </p:nvSpPr>
+          <p:spPr>
+            <a:xfrm>
+              <a:off x="639704" y="1439122"/>
+              <a:ext cx="501613" cy="421783"/>
+            </a:xfrm>
+            <a:prstGeom prst="triangle">
+              <a:avLst/>
+            </a:prstGeom>
+            <a:solidFill>
+              <a:srgbClr val="FC265C"/>
+            </a:solidFill>
+            <a:ln>
+              <a:noFill/>
+            </a:ln>
+            <a:effectLst/>
+          </p:spPr>
+          <p:style>
+            <a:lnRef idx="1">
+              <a:schemeClr val="accent1"/>
+            </a:lnRef>
+            <a:fillRef idx="3">
+              <a:schemeClr val="accent1"/>
+            </a:fillRef>
+            <a:effectRef idx="2">
+              <a:schemeClr val="accent1"/>
+            </a:effectRef>
+            <a:fontRef idx="minor">
+              <a:schemeClr val="lt1"/>
+            </a:fontRef>
+          </p:style>
+          <p:txBody>
+            <a:bodyPr rtlCol="0" anchor="ctr"/>
+            <a:lstStyle/>
+            <a:p>
+              <a:pPr algn="ctr"/>
+              <a:endParaRPr lang="en-US" sz="1600" dirty="0">
+                <a:latin typeface="Gill Sans"/>
+                <a:cs typeface="Gill Sans"/>
+              </a:endParaRPr>
+            </a:p>
+          </p:txBody>
+        </p:sp>
+        <p:sp>
+          <p:nvSpPr>
+            <p:cNvPr id="40" name="Rectangular Callout 39"/>
+            <p:cNvSpPr/>
+            <p:nvPr/>
+          </p:nvSpPr>
+          <p:spPr>
+            <a:xfrm rot="5400000">
+              <a:off x="4635700" y="1687432"/>
+              <a:ext cx="2632142" cy="2178872"/>
+            </a:xfrm>
+            <a:prstGeom prst="wedgeRectCallout">
+              <a:avLst>
+                <a:gd name="adj1" fmla="val 930"/>
+                <a:gd name="adj2" fmla="val 78219"/>
+              </a:avLst>
+            </a:prstGeom>
+            <a:solidFill>
+              <a:schemeClr val="bg1">
+                <a:lumMod val="85000"/>
+              </a:schemeClr>
+            </a:solidFill>
+            <a:ln>
+              <a:noFill/>
+            </a:ln>
+            <a:effectLst/>
+          </p:spPr>
+          <p:style>
+            <a:lnRef idx="1">
+              <a:schemeClr val="accent1"/>
+            </a:lnRef>
+            <a:fillRef idx="3">
+              <a:schemeClr val="accent1"/>
+            </a:fillRef>
+            <a:effectRef idx="2">
+              <a:schemeClr val="accent1"/>
+            </a:effectRef>
+            <a:fontRef idx="minor">
+              <a:schemeClr val="lt1"/>
+            </a:fontRef>
+          </p:style>
+          <p:txBody>
+            <a:bodyPr rot="0" spcFirstLastPara="0" vertOverflow="overflow" horzOverflow="overflow" vert="horz" wrap="square" lIns="91440" tIns="45720" rIns="91440" bIns="45720" numCol="1" spcCol="0" rtlCol="0" fromWordArt="0" anchor="ctr" anchorCtr="0" forceAA="0" compatLnSpc="1">
+              <a:prstTxWarp prst="textNoShape">
+                <a:avLst/>
+              </a:prstTxWarp>
+              <a:noAutofit/>
+            </a:bodyPr>
+            <a:lstStyle/>
+            <a:p>
+              <a:pPr algn="ctr"/>
+              <a:endParaRPr lang="en-US" dirty="0">
+                <a:latin typeface="Gill Sans"/>
+                <a:cs typeface="Gill Sans"/>
+              </a:endParaRPr>
+            </a:p>
+          </p:txBody>
+        </p:sp>
+        <p:sp>
+          <p:nvSpPr>
+            <p:cNvPr id="41" name="TextBox 40"/>
+            <p:cNvSpPr txBox="1"/>
+            <p:nvPr/>
+          </p:nvSpPr>
+          <p:spPr>
+            <a:xfrm>
+              <a:off x="4986787" y="1739552"/>
+              <a:ext cx="1942419" cy="1477328"/>
+            </a:xfrm>
+            <a:prstGeom prst="rect">
+              <a:avLst/>
+            </a:prstGeom>
+            <a:noFill/>
+          </p:spPr>
+          <p:txBody>
+            <a:bodyPr wrap="square" rtlCol="0">
+              <a:spAutoFit/>
+            </a:bodyPr>
+            <a:lstStyle/>
+            <a:p>
+              <a:r>
+                <a:rPr lang="en-US" dirty="0" smtClean="0">
+                  <a:latin typeface="Gill Sans"/>
+                  <a:cs typeface="Gill Sans"/>
+                </a:rPr>
+                <a:t>Current</a:t>
+              </a:r>
+            </a:p>
+            <a:p>
+              <a:r>
+                <a:rPr lang="en-US" b="1" dirty="0" err="1" smtClean="0">
+                  <a:solidFill>
+                    <a:schemeClr val="tx1">
+                      <a:lumMod val="95000"/>
+                      <a:lumOff val="5000"/>
+                    </a:schemeClr>
+                  </a:solidFill>
+                  <a:latin typeface="Gill Sans"/>
+                  <a:cs typeface="Gill Sans"/>
+                </a:rPr>
+                <a:t>Jaccard</a:t>
+              </a:r>
+              <a:endParaRPr lang="en-US" b="1" dirty="0" smtClean="0">
+                <a:solidFill>
+                  <a:schemeClr val="tx1">
+                    <a:lumMod val="95000"/>
+                    <a:lumOff val="5000"/>
+                  </a:schemeClr>
+                </a:solidFill>
+                <a:latin typeface="Gill Sans"/>
+                <a:cs typeface="Gill Sans"/>
+              </a:endParaRPr>
+            </a:p>
+            <a:p>
+              <a:endParaRPr lang="en-US" dirty="0">
+                <a:latin typeface="Gill Sans"/>
+                <a:cs typeface="Gill Sans"/>
+              </a:endParaRPr>
+            </a:p>
+            <a:p>
+              <a:r>
+                <a:rPr lang="en-US" dirty="0" smtClean="0">
+                  <a:latin typeface="Gill Sans"/>
+                  <a:cs typeface="Gill Sans"/>
+                </a:rPr>
+                <a:t>Recommendation</a:t>
+              </a:r>
+            </a:p>
+            <a:p>
+              <a:r>
+                <a:rPr lang="en-US" b="1" dirty="0" smtClean="0">
+                  <a:latin typeface="Gill Sans"/>
+                  <a:cs typeface="Gill Sans"/>
+                </a:rPr>
+                <a:t>Edit Distance</a:t>
+              </a:r>
+              <a:endParaRPr lang="en-US" b="1" dirty="0">
+                <a:latin typeface="Gill Sans"/>
+                <a:cs typeface="Gill Sans"/>
+              </a:endParaRPr>
+            </a:p>
+          </p:txBody>
+        </p:sp>
+      </p:grpSp>
+    </p:spTree>
+    <p:extLst>
+      <p:ext uri="{BB962C8B-B14F-4D97-AF65-F5344CB8AC3E}">
+        <p14:creationId xmlns:p14="http://schemas.microsoft.com/office/powerpoint/2010/main" val="2991822472"/>
+      </p:ext>
+    </p:extLst>
+  </p:cSld>
+  <p:clrMapOvr>
+    <a:masterClrMapping/>
+  </p:clrMapOvr>
+</p:sld>
+</file>
+
+<file path=ppt/slides/slide7.xml><?xml version="1.0" encoding="utf-8"?>
+<p:sld xmlns:a="http://schemas.openxmlformats.org/drawingml/2006/main" xmlns:r="http://schemas.openxmlformats.org/officeDocument/2006/relationships" xmlns:p="http://schemas.openxmlformats.org/presentationml/2006/main">
+  <p:cSld>
+    <p:spTree>
+      <p:nvGrpSpPr>
+        <p:cNvPr id="1" name=""/>
+        <p:cNvGrpSpPr/>
+        <p:nvPr/>
+      </p:nvGrpSpPr>
+      <p:grpSpPr>
+        <a:xfrm>
+          <a:off x="0" y="0"/>
+          <a:ext cx="0" cy="0"/>
+          <a:chOff x="0" y="0"/>
+          <a:chExt cx="0" cy="0"/>
+        </a:xfrm>
+      </p:grpSpPr>
       <p:sp>
         <p:nvSpPr>
-          <p:cNvPr id="6" name="Rectangle 5"/>
+          <p:cNvPr id="4" name="Rectangular Callout 3"/>
           <p:cNvSpPr/>
           <p:nvPr/>
         </p:nvSpPr>
         <p:spPr>
           <a:xfrm>
-            <a:off x="639704" y="1947333"/>
-            <a:ext cx="3752876" cy="2145605"/>
+            <a:off x="4619008" y="1460792"/>
+            <a:ext cx="4024688" cy="1525663"/>
           </a:xfrm>
-          <a:prstGeom prst="rect">
-            <a:avLst/>
+          <a:prstGeom prst="wedgeRectCallout">
+            <a:avLst>
+              <a:gd name="adj1" fmla="val -21015"/>
+              <a:gd name="adj2" fmla="val 100715"/>
+            </a:avLst>
           </a:prstGeom>
           <a:solidFill>
-            <a:schemeClr val="bg1"/>
+            <a:srgbClr val="D9D9D9"/>
           </a:solidFill>
           <a:ln>
-            <a:solidFill>
-              <a:srgbClr val="BFBFBF"/>
-            </a:solidFill>
+            <a:noFill/>
           </a:ln>
           <a:effectLst/>
         </p:spPr>
@@ -11727,107 +12845,70 @@
           <a:lstStyle/>
           <a:p>
             <a:pPr algn="ctr"/>
-            <a:endParaRPr lang="en-US">
-              <a:latin typeface="Gill Sans"/>
-              <a:cs typeface="Gill Sans"/>
-            </a:endParaRPr>
+            <a:endParaRPr lang="en-US"/>
           </a:p>
         </p:txBody>
       </p:sp>
+      <p:cxnSp>
+        <p:nvCxnSpPr>
+          <p:cNvPr id="5" name="Straight Arrow Connector 4"/>
+          <p:cNvCxnSpPr/>
+          <p:nvPr/>
+        </p:nvCxnSpPr>
+        <p:spPr>
+          <a:xfrm>
+            <a:off x="5496724" y="3784279"/>
+            <a:ext cx="2960535" cy="0"/>
+          </a:xfrm>
+          <a:prstGeom prst="straightConnector1">
+            <a:avLst/>
+          </a:prstGeom>
+          <a:solidFill>
+            <a:srgbClr val="D5B9C5"/>
+          </a:solidFill>
+          <a:ln w="28575" cmpd="sng">
+            <a:solidFill>
+              <a:srgbClr val="F80068"/>
+            </a:solidFill>
+            <a:headEnd type="none"/>
+            <a:tailEnd type="arrow"/>
+          </a:ln>
+          <a:effectLst/>
+        </p:spPr>
+        <p:style>
+          <a:lnRef idx="2">
+            <a:schemeClr val="accent1"/>
+          </a:lnRef>
+          <a:fillRef idx="0">
+            <a:schemeClr val="accent1"/>
+          </a:fillRef>
+          <a:effectRef idx="1">
+            <a:schemeClr val="accent1"/>
+          </a:effectRef>
+          <a:fontRef idx="minor">
+            <a:schemeClr val="tx1"/>
+          </a:fontRef>
+        </p:style>
+      </p:cxnSp>
       <p:sp>
         <p:nvSpPr>
-          <p:cNvPr id="9" name="Rectangle 8"/>
+          <p:cNvPr id="6" name="Regular Pentagon 5"/>
           <p:cNvSpPr/>
           <p:nvPr/>
         </p:nvSpPr>
         <p:spPr>
           <a:xfrm>
-            <a:off x="2344413" y="2539994"/>
-            <a:ext cx="1531806" cy="325559"/>
+            <a:off x="7700725" y="3278205"/>
+            <a:ext cx="954094" cy="929843"/>
           </a:xfrm>
-          <a:prstGeom prst="rect">
+          <a:prstGeom prst="pentagon">
             <a:avLst/>
           </a:prstGeom>
           <a:solidFill>
-            <a:schemeClr val="bg1"/>
+            <a:srgbClr val="FC265C"/>
           </a:solidFill>
           <a:ln>
-            <a:solidFill>
-              <a:schemeClr val="bg1">
-                <a:lumMod val="50000"/>
-              </a:schemeClr>
-            </a:solidFill>
-          </a:ln>
-          <a:effectLst/>
-        </p:spPr>
-        <p:style>
-          <a:lnRef idx="1">
-            <a:schemeClr val="accent1"/>
-          </a:lnRef>
-          <a:fillRef idx="3">
-            <a:schemeClr val="accent1"/>
-          </a:fillRef>
-          <a:effectRef idx="2">
-            <a:schemeClr val="accent1"/>
-          </a:effectRef>
-          <a:fontRef idx="minor">
-            <a:schemeClr val="lt1"/>
-          </a:fontRef>
-        </p:style>
-        <p:txBody>
-          <a:bodyPr rtlCol="0" anchor="ctr"/>
-          <a:lstStyle/>
-          <a:p>
-            <a:pPr algn="ctr"/>
-            <a:r>
-              <a:rPr lang="en-US" sz="1600" dirty="0" err="1" smtClean="0">
-                <a:solidFill>
-                  <a:schemeClr val="tx1">
-                    <a:lumMod val="75000"/>
-                    <a:lumOff val="25000"/>
-                  </a:schemeClr>
-                </a:solidFill>
-                <a:latin typeface="Gill Sans"/>
-                <a:cs typeface="Gill Sans"/>
-              </a:rPr>
-              <a:t>Jaccard</a:t>
-            </a:r>
-            <a:endParaRPr lang="en-US" sz="1600" dirty="0">
-              <a:solidFill>
-                <a:schemeClr val="tx1">
-                  <a:lumMod val="75000"/>
-                  <a:lumOff val="25000"/>
-                </a:schemeClr>
-              </a:solidFill>
-              <a:latin typeface="Gill Sans"/>
-              <a:cs typeface="Gill Sans"/>
-            </a:endParaRPr>
-          </a:p>
-        </p:txBody>
-      </p:sp>
-      <p:sp>
-        <p:nvSpPr>
-          <p:cNvPr id="10" name="Rectangle 9"/>
-          <p:cNvSpPr/>
-          <p:nvPr/>
-        </p:nvSpPr>
-        <p:spPr>
-          <a:xfrm>
-            <a:off x="3876219" y="2541708"/>
-            <a:ext cx="312325" cy="325559"/>
-          </a:xfrm>
-          <a:prstGeom prst="rect">
-            <a:avLst/>
-          </a:prstGeom>
-          <a:solidFill>
-            <a:schemeClr val="bg1"/>
-          </a:solidFill>
-          <a:ln>
-            <a:solidFill>
-              <a:schemeClr val="bg1">
-                <a:lumMod val="50000"/>
-              </a:schemeClr>
-            </a:solidFill>
+            <a:noFill/>
           </a:ln>
           <a:effectLst/>
         </p:spPr>
@@ -11859,634 +12940,14 @@
       </p:sp>
       <p:sp>
         <p:nvSpPr>
-          <p:cNvPr id="11" name="Isosceles Triangle 10"/>
-          <p:cNvSpPr/>
-          <p:nvPr/>
-        </p:nvSpPr>
-        <p:spPr>
-          <a:xfrm rot="10800000">
-            <a:off x="3933874" y="2603256"/>
-            <a:ext cx="171652" cy="175388"/>
-          </a:xfrm>
-          <a:prstGeom prst="triangle">
-            <a:avLst/>
-          </a:prstGeom>
-          <a:solidFill>
-            <a:schemeClr val="bg1">
-              <a:lumMod val="50000"/>
-            </a:schemeClr>
-          </a:solidFill>
-          <a:ln>
-            <a:solidFill>
-              <a:schemeClr val="bg1">
-                <a:lumMod val="50000"/>
-              </a:schemeClr>
-            </a:solidFill>
-          </a:ln>
-          <a:effectLst/>
-        </p:spPr>
-        <p:style>
-          <a:lnRef idx="1">
-            <a:schemeClr val="accent1"/>
-          </a:lnRef>
-          <a:fillRef idx="3">
-            <a:schemeClr val="accent1"/>
-          </a:fillRef>
-          <a:effectRef idx="2">
-            <a:schemeClr val="accent1"/>
-          </a:effectRef>
-          <a:fontRef idx="minor">
-            <a:schemeClr val="lt1"/>
-          </a:fontRef>
-        </p:style>
-        <p:txBody>
-          <a:bodyPr rtlCol="0" anchor="ctr"/>
-          <a:lstStyle/>
-          <a:p>
-            <a:pPr algn="ctr"/>
-            <a:endParaRPr lang="en-US" sz="1600">
-              <a:latin typeface="Gill Sans"/>
-              <a:cs typeface="Gill Sans"/>
-            </a:endParaRPr>
-          </a:p>
-        </p:txBody>
-      </p:sp>
-      <p:sp>
-        <p:nvSpPr>
-          <p:cNvPr id="15" name="TextBox 14"/>
-          <p:cNvSpPr txBox="1"/>
-          <p:nvPr/>
-        </p:nvSpPr>
-        <p:spPr>
-          <a:xfrm>
-            <a:off x="734993" y="2496221"/>
-            <a:ext cx="1543061" cy="369332"/>
-          </a:xfrm>
-          <a:prstGeom prst="rect">
-            <a:avLst/>
-          </a:prstGeom>
-          <a:noFill/>
-        </p:spPr>
-        <p:txBody>
-          <a:bodyPr wrap="none" rtlCol="0">
-            <a:spAutoFit/>
-          </a:bodyPr>
-          <a:lstStyle/>
-          <a:p>
-            <a:r>
-              <a:rPr lang="en-US" dirty="0" smtClean="0">
-                <a:latin typeface="Gill Sans"/>
-                <a:cs typeface="Gill Sans"/>
-              </a:rPr>
-              <a:t>Similarity </a:t>
-            </a:r>
-            <a:r>
-              <a:rPr lang="en-US" dirty="0" err="1" smtClean="0">
-                <a:latin typeface="Gill Sans"/>
-                <a:cs typeface="Gill Sans"/>
-              </a:rPr>
-              <a:t>Func</a:t>
-            </a:r>
-            <a:endParaRPr lang="en-US" dirty="0" smtClean="0">
-              <a:latin typeface="Gill Sans"/>
-              <a:cs typeface="Gill Sans"/>
-            </a:endParaRPr>
-          </a:p>
-        </p:txBody>
-      </p:sp>
-      <p:sp>
-        <p:nvSpPr>
-          <p:cNvPr id="22" name="TextBox 21"/>
-          <p:cNvSpPr txBox="1"/>
-          <p:nvPr/>
-        </p:nvSpPr>
-        <p:spPr>
-          <a:xfrm>
-            <a:off x="1141317" y="3001069"/>
-            <a:ext cx="1136737" cy="369332"/>
-          </a:xfrm>
-          <a:prstGeom prst="rect">
-            <a:avLst/>
-          </a:prstGeom>
-          <a:noFill/>
-        </p:spPr>
-        <p:txBody>
-          <a:bodyPr wrap="none" rtlCol="0">
-            <a:spAutoFit/>
-          </a:bodyPr>
-          <a:lstStyle/>
-          <a:p>
-            <a:r>
-              <a:rPr lang="en-US" dirty="0" smtClean="0">
-                <a:latin typeface="Gill Sans"/>
-                <a:cs typeface="Gill Sans"/>
-              </a:rPr>
-              <a:t>Threshold</a:t>
-            </a:r>
-          </a:p>
-        </p:txBody>
-      </p:sp>
-      <p:sp>
-        <p:nvSpPr>
-          <p:cNvPr id="23" name="Rectangle 22"/>
+          <p:cNvPr id="7" name="Isosceles Triangle 6"/>
           <p:cNvSpPr/>
           <p:nvPr/>
         </p:nvSpPr>
         <p:spPr>
           <a:xfrm>
-            <a:off x="2344412" y="3500077"/>
-            <a:ext cx="1844131" cy="325559"/>
-          </a:xfrm>
-          <a:prstGeom prst="rect">
-            <a:avLst/>
-          </a:prstGeom>
-          <a:solidFill>
-            <a:schemeClr val="bg1"/>
-          </a:solidFill>
-          <a:ln>
-            <a:solidFill>
-              <a:schemeClr val="bg1">
-                <a:lumMod val="50000"/>
-              </a:schemeClr>
-            </a:solidFill>
-          </a:ln>
-          <a:effectLst/>
-        </p:spPr>
-        <p:style>
-          <a:lnRef idx="1">
-            <a:schemeClr val="accent1"/>
-          </a:lnRef>
-          <a:fillRef idx="3">
-            <a:schemeClr val="accent1"/>
-          </a:fillRef>
-          <a:effectRef idx="2">
-            <a:schemeClr val="accent1"/>
-          </a:effectRef>
-          <a:fontRef idx="minor">
-            <a:schemeClr val="lt1"/>
-          </a:fontRef>
-        </p:style>
-        <p:txBody>
-          <a:bodyPr rtlCol="0" anchor="ctr"/>
-          <a:lstStyle/>
-          <a:p>
-            <a:pPr algn="ctr"/>
-            <a:r>
-              <a:rPr lang="en-US" sz="1600" dirty="0" smtClean="0">
-                <a:solidFill>
-                  <a:schemeClr val="tx1">
-                    <a:lumMod val="75000"/>
-                    <a:lumOff val="25000"/>
-                  </a:schemeClr>
-                </a:solidFill>
-                <a:latin typeface="Gill Sans"/>
-                <a:cs typeface="Gill Sans"/>
-              </a:rPr>
-              <a:t>\s+</a:t>
-            </a:r>
-            <a:endParaRPr lang="en-US" sz="1600" dirty="0">
-              <a:solidFill>
-                <a:schemeClr val="tx1">
-                  <a:lumMod val="75000"/>
-                  <a:lumOff val="25000"/>
-                </a:schemeClr>
-              </a:solidFill>
-              <a:latin typeface="Gill Sans"/>
-              <a:cs typeface="Gill Sans"/>
-            </a:endParaRPr>
-          </a:p>
-        </p:txBody>
-      </p:sp>
-      <p:sp>
-        <p:nvSpPr>
-          <p:cNvPr id="26" name="TextBox 25"/>
-          <p:cNvSpPr txBox="1"/>
-          <p:nvPr/>
-        </p:nvSpPr>
-        <p:spPr>
-          <a:xfrm>
-            <a:off x="1182682" y="3456304"/>
-            <a:ext cx="1095372" cy="369332"/>
-          </a:xfrm>
-          <a:prstGeom prst="rect">
-            <a:avLst/>
-          </a:prstGeom>
-          <a:noFill/>
-        </p:spPr>
-        <p:txBody>
-          <a:bodyPr wrap="none" rtlCol="0">
-            <a:spAutoFit/>
-          </a:bodyPr>
-          <a:lstStyle/>
-          <a:p>
-            <a:r>
-              <a:rPr lang="en-US" dirty="0" err="1" smtClean="0">
-                <a:latin typeface="Gill Sans"/>
-                <a:cs typeface="Gill Sans"/>
-              </a:rPr>
-              <a:t>Tokenizer</a:t>
-            </a:r>
-            <a:endParaRPr lang="en-US" dirty="0" smtClean="0">
-              <a:latin typeface="Gill Sans"/>
-              <a:cs typeface="Gill Sans"/>
-            </a:endParaRPr>
-          </a:p>
-        </p:txBody>
-      </p:sp>
-      <p:sp>
-        <p:nvSpPr>
-          <p:cNvPr id="27" name="Rectangle 26"/>
-          <p:cNvSpPr/>
-          <p:nvPr/>
-        </p:nvSpPr>
-        <p:spPr>
-          <a:xfrm>
-            <a:off x="2344413" y="2152657"/>
-            <a:ext cx="1531806" cy="325559"/>
-          </a:xfrm>
-          <a:prstGeom prst="rect">
-            <a:avLst/>
-          </a:prstGeom>
-          <a:solidFill>
-            <a:schemeClr val="bg1"/>
-          </a:solidFill>
-          <a:ln>
-            <a:solidFill>
-              <a:schemeClr val="bg1">
-                <a:lumMod val="50000"/>
-              </a:schemeClr>
-            </a:solidFill>
-          </a:ln>
-          <a:effectLst/>
-        </p:spPr>
-        <p:style>
-          <a:lnRef idx="1">
-            <a:schemeClr val="accent1"/>
-          </a:lnRef>
-          <a:fillRef idx="3">
-            <a:schemeClr val="accent1"/>
-          </a:fillRef>
-          <a:effectRef idx="2">
-            <a:schemeClr val="accent1"/>
-          </a:effectRef>
-          <a:fontRef idx="minor">
-            <a:schemeClr val="lt1"/>
-          </a:fontRef>
-        </p:style>
-        <p:txBody>
-          <a:bodyPr rtlCol="0" anchor="ctr"/>
-          <a:lstStyle/>
-          <a:p>
-            <a:pPr algn="ctr"/>
-            <a:r>
-              <a:rPr lang="en-US" sz="1600" dirty="0" smtClean="0">
-                <a:solidFill>
-                  <a:schemeClr val="tx1">
-                    <a:lumMod val="75000"/>
-                    <a:lumOff val="25000"/>
-                  </a:schemeClr>
-                </a:solidFill>
-                <a:latin typeface="Gill Sans"/>
-                <a:cs typeface="Gill Sans"/>
-              </a:rPr>
-              <a:t>Broadcast</a:t>
-            </a:r>
-            <a:endParaRPr lang="en-US" sz="1600" dirty="0">
-              <a:solidFill>
-                <a:schemeClr val="tx1">
-                  <a:lumMod val="75000"/>
-                  <a:lumOff val="25000"/>
-                </a:schemeClr>
-              </a:solidFill>
-              <a:latin typeface="Gill Sans"/>
-              <a:cs typeface="Gill Sans"/>
-            </a:endParaRPr>
-          </a:p>
-        </p:txBody>
-      </p:sp>
-      <p:sp>
-        <p:nvSpPr>
-          <p:cNvPr id="28" name="Rectangle 27"/>
-          <p:cNvSpPr/>
-          <p:nvPr/>
-        </p:nvSpPr>
-        <p:spPr>
-          <a:xfrm>
-            <a:off x="3876219" y="2154371"/>
-            <a:ext cx="312325" cy="325559"/>
-          </a:xfrm>
-          <a:prstGeom prst="rect">
-            <a:avLst/>
-          </a:prstGeom>
-          <a:solidFill>
-            <a:schemeClr val="bg1"/>
-          </a:solidFill>
-          <a:ln>
-            <a:solidFill>
-              <a:schemeClr val="bg1">
-                <a:lumMod val="50000"/>
-              </a:schemeClr>
-            </a:solidFill>
-          </a:ln>
-          <a:effectLst/>
-        </p:spPr>
-        <p:style>
-          <a:lnRef idx="1">
-            <a:schemeClr val="accent1"/>
-          </a:lnRef>
-          <a:fillRef idx="3">
-            <a:schemeClr val="accent1"/>
-          </a:fillRef>
-          <a:effectRef idx="2">
-            <a:schemeClr val="accent1"/>
-          </a:effectRef>
-          <a:fontRef idx="minor">
-            <a:schemeClr val="lt1"/>
-          </a:fontRef>
-        </p:style>
-        <p:txBody>
-          <a:bodyPr rtlCol="0" anchor="ctr"/>
-          <a:lstStyle/>
-          <a:p>
-            <a:pPr algn="ctr"/>
-            <a:endParaRPr lang="en-US" sz="1600">
-              <a:latin typeface="Gill Sans"/>
-              <a:cs typeface="Gill Sans"/>
-            </a:endParaRPr>
-          </a:p>
-        </p:txBody>
-      </p:sp>
-      <p:sp>
-        <p:nvSpPr>
-          <p:cNvPr id="29" name="Isosceles Triangle 28"/>
-          <p:cNvSpPr/>
-          <p:nvPr/>
-        </p:nvSpPr>
-        <p:spPr>
-          <a:xfrm rot="10800000">
-            <a:off x="3933874" y="2215919"/>
-            <a:ext cx="171652" cy="175388"/>
-          </a:xfrm>
-          <a:prstGeom prst="triangle">
-            <a:avLst/>
-          </a:prstGeom>
-          <a:solidFill>
-            <a:schemeClr val="bg1">
-              <a:lumMod val="50000"/>
-            </a:schemeClr>
-          </a:solidFill>
-          <a:ln>
-            <a:solidFill>
-              <a:schemeClr val="bg1">
-                <a:lumMod val="50000"/>
-              </a:schemeClr>
-            </a:solidFill>
-          </a:ln>
-          <a:effectLst/>
-        </p:spPr>
-        <p:style>
-          <a:lnRef idx="1">
-            <a:schemeClr val="accent1"/>
-          </a:lnRef>
-          <a:fillRef idx="3">
-            <a:schemeClr val="accent1"/>
-          </a:fillRef>
-          <a:effectRef idx="2">
-            <a:schemeClr val="accent1"/>
-          </a:effectRef>
-          <a:fontRef idx="minor">
-            <a:schemeClr val="lt1"/>
-          </a:fontRef>
-        </p:style>
-        <p:txBody>
-          <a:bodyPr rtlCol="0" anchor="ctr"/>
-          <a:lstStyle/>
-          <a:p>
-            <a:pPr algn="ctr"/>
-            <a:endParaRPr lang="en-US" sz="1600">
-              <a:latin typeface="Gill Sans"/>
-              <a:cs typeface="Gill Sans"/>
-            </a:endParaRPr>
-          </a:p>
-        </p:txBody>
-      </p:sp>
-      <p:sp>
-        <p:nvSpPr>
-          <p:cNvPr id="30" name="TextBox 29"/>
-          <p:cNvSpPr txBox="1"/>
-          <p:nvPr/>
-        </p:nvSpPr>
-        <p:spPr>
-          <a:xfrm>
-            <a:off x="1254817" y="2108884"/>
-            <a:ext cx="1023237" cy="369332"/>
-          </a:xfrm>
-          <a:prstGeom prst="rect">
-            <a:avLst/>
-          </a:prstGeom>
-          <a:noFill/>
-        </p:spPr>
-        <p:txBody>
-          <a:bodyPr wrap="none" rtlCol="0">
-            <a:spAutoFit/>
-          </a:bodyPr>
-          <a:lstStyle/>
-          <a:p>
-            <a:r>
-              <a:rPr lang="en-US" dirty="0" smtClean="0">
-                <a:latin typeface="Gill Sans"/>
-                <a:cs typeface="Gill Sans"/>
-              </a:rPr>
-              <a:t>Join </a:t>
-            </a:r>
-            <a:r>
-              <a:rPr lang="en-US" dirty="0" err="1" smtClean="0">
-                <a:latin typeface="Gill Sans"/>
-                <a:cs typeface="Gill Sans"/>
-              </a:rPr>
-              <a:t>Impl</a:t>
-            </a:r>
-            <a:endParaRPr lang="en-US" dirty="0" smtClean="0">
-              <a:latin typeface="Gill Sans"/>
-              <a:cs typeface="Gill Sans"/>
-            </a:endParaRPr>
-          </a:p>
-        </p:txBody>
-      </p:sp>
-      <p:cxnSp>
-        <p:nvCxnSpPr>
-          <p:cNvPr id="32" name="Straight Connector 31"/>
-          <p:cNvCxnSpPr/>
-          <p:nvPr/>
-        </p:nvCxnSpPr>
-        <p:spPr>
-          <a:xfrm>
-            <a:off x="2734557" y="3225382"/>
-            <a:ext cx="1453987" cy="0"/>
-          </a:xfrm>
-          <a:prstGeom prst="line">
-            <a:avLst/>
-          </a:prstGeom>
-          <a:ln>
-            <a:solidFill>
-              <a:srgbClr val="7F7F7F"/>
-            </a:solidFill>
-            <a:headEnd type="none"/>
-            <a:tailEnd type="none"/>
-          </a:ln>
-          <a:effectLst/>
-        </p:spPr>
-        <p:style>
-          <a:lnRef idx="2">
-            <a:schemeClr val="accent1"/>
-          </a:lnRef>
-          <a:fillRef idx="0">
-            <a:schemeClr val="accent1"/>
-          </a:fillRef>
-          <a:effectRef idx="1">
-            <a:schemeClr val="accent1"/>
-          </a:effectRef>
-          <a:fontRef idx="minor">
-            <a:schemeClr val="tx1"/>
-          </a:fontRef>
-        </p:style>
-      </p:cxnSp>
-      <p:sp>
-        <p:nvSpPr>
-          <p:cNvPr id="33" name="Isosceles Triangle 32"/>
-          <p:cNvSpPr/>
-          <p:nvPr/>
-        </p:nvSpPr>
-        <p:spPr>
-          <a:xfrm>
-            <a:off x="3742130" y="3127532"/>
-            <a:ext cx="171652" cy="175388"/>
-          </a:xfrm>
-          <a:prstGeom prst="triangle">
-            <a:avLst/>
-          </a:prstGeom>
-          <a:solidFill>
-            <a:schemeClr val="bg1">
-              <a:lumMod val="50000"/>
-            </a:schemeClr>
-          </a:solidFill>
-          <a:ln>
-            <a:solidFill>
-              <a:schemeClr val="bg1">
-                <a:lumMod val="50000"/>
-              </a:schemeClr>
-            </a:solidFill>
-          </a:ln>
-          <a:effectLst/>
-        </p:spPr>
-        <p:style>
-          <a:lnRef idx="1">
-            <a:schemeClr val="accent1"/>
-          </a:lnRef>
-          <a:fillRef idx="3">
-            <a:schemeClr val="accent1"/>
-          </a:fillRef>
-          <a:effectRef idx="2">
-            <a:schemeClr val="accent1"/>
-          </a:effectRef>
-          <a:fontRef idx="minor">
-            <a:schemeClr val="lt1"/>
-          </a:fontRef>
-        </p:style>
-        <p:txBody>
-          <a:bodyPr rtlCol="0" anchor="ctr"/>
-          <a:lstStyle/>
-          <a:p>
-            <a:pPr algn="ctr"/>
-            <a:endParaRPr lang="en-US" sz="1600">
-              <a:latin typeface="Gill Sans"/>
-              <a:cs typeface="Gill Sans"/>
-            </a:endParaRPr>
-          </a:p>
-        </p:txBody>
-      </p:sp>
-      <p:sp>
-        <p:nvSpPr>
-          <p:cNvPr id="34" name="TextBox 33"/>
-          <p:cNvSpPr txBox="1"/>
-          <p:nvPr/>
-        </p:nvSpPr>
-        <p:spPr>
-          <a:xfrm>
-            <a:off x="2281959" y="3013182"/>
-            <a:ext cx="479618" cy="369332"/>
-          </a:xfrm>
-          <a:prstGeom prst="rect">
-            <a:avLst/>
-          </a:prstGeom>
-          <a:noFill/>
-        </p:spPr>
-        <p:txBody>
-          <a:bodyPr wrap="none" rtlCol="0">
-            <a:spAutoFit/>
-          </a:bodyPr>
-          <a:lstStyle/>
-          <a:p>
-            <a:r>
-              <a:rPr lang="en-US" dirty="0" smtClean="0">
-                <a:latin typeface="Gill Sans"/>
-                <a:cs typeface="Gill Sans"/>
-              </a:rPr>
-              <a:t>0.8</a:t>
-            </a:r>
-            <a:endParaRPr lang="en-US" dirty="0">
-              <a:latin typeface="Gill Sans"/>
-              <a:cs typeface="Gill Sans"/>
-            </a:endParaRPr>
-          </a:p>
-        </p:txBody>
-      </p:sp>
-      <p:sp>
-        <p:nvSpPr>
-          <p:cNvPr id="36" name="TextBox 35"/>
-          <p:cNvSpPr txBox="1"/>
-          <p:nvPr/>
-        </p:nvSpPr>
-        <p:spPr>
-          <a:xfrm>
-            <a:off x="1209692" y="1460795"/>
-            <a:ext cx="1625741" cy="400110"/>
-          </a:xfrm>
-          <a:prstGeom prst="rect">
-            <a:avLst/>
-          </a:prstGeom>
-          <a:noFill/>
-        </p:spPr>
-        <p:txBody>
-          <a:bodyPr wrap="none" rtlCol="0">
-            <a:spAutoFit/>
-          </a:bodyPr>
-          <a:lstStyle/>
-          <a:p>
-            <a:r>
-              <a:rPr lang="en-US" sz="2000" dirty="0" smtClean="0">
-                <a:latin typeface="Gill Sans"/>
-                <a:cs typeface="Gill Sans"/>
-              </a:rPr>
-              <a:t>Similarity Join</a:t>
-            </a:r>
-            <a:endParaRPr lang="en-US" sz="2000" dirty="0">
-              <a:latin typeface="Gill Sans"/>
-              <a:cs typeface="Gill Sans"/>
-            </a:endParaRPr>
-          </a:p>
-        </p:txBody>
-      </p:sp>
-      <p:sp>
-        <p:nvSpPr>
-          <p:cNvPr id="37" name="Isosceles Triangle 36"/>
-          <p:cNvSpPr/>
-          <p:nvPr/>
-        </p:nvSpPr>
-        <p:spPr>
-          <a:xfrm>
-            <a:off x="639704" y="1439122"/>
-            <a:ext cx="501613" cy="421783"/>
+            <a:off x="5994622" y="3252101"/>
+            <a:ext cx="1136876" cy="955947"/>
           </a:xfrm>
           <a:prstGeom prst="triangle">
             <a:avLst/>
@@ -12527,55 +12988,44 @@
       </p:sp>
       <p:sp>
         <p:nvSpPr>
-          <p:cNvPr id="40" name="Rectangular Callout 39"/>
-          <p:cNvSpPr/>
+          <p:cNvPr id="8" name="TextBox 7"/>
+          <p:cNvSpPr txBox="1"/>
           <p:nvPr/>
         </p:nvSpPr>
         <p:spPr>
-          <a:xfrm rot="5400000">
-            <a:off x="4635700" y="1687432"/>
-            <a:ext cx="2632142" cy="2178872"/>
+          <a:xfrm>
+            <a:off x="4619008" y="3471333"/>
+            <a:ext cx="852479" cy="646331"/>
           </a:xfrm>
-          <a:prstGeom prst="wedgeRectCallout">
-            <a:avLst>
-              <a:gd name="adj1" fmla="val 930"/>
-              <a:gd name="adj2" fmla="val 78219"/>
-            </a:avLst>
+          <a:prstGeom prst="rect">
+            <a:avLst/>
           </a:prstGeom>
-          <a:solidFill>
-            <a:schemeClr val="bg1">
-              <a:lumMod val="85000"/>
-            </a:schemeClr>
-          </a:solidFill>
-          <a:ln>
-            <a:noFill/>
-          </a:ln>
-          <a:effectLst/>
+          <a:noFill/>
         </p:spPr>
-        <p:style>
-          <a:lnRef idx="1">
-            <a:schemeClr val="accent1"/>
-          </a:lnRef>
-          <a:fillRef idx="3">
-            <a:schemeClr val="accent1"/>
-          </a:fillRef>
-          <a:effectRef idx="2">
-            <a:schemeClr val="accent1"/>
-          </a:effectRef>
-          <a:fontRef idx="minor">
-            <a:schemeClr val="lt1"/>
-          </a:fontRef>
-        </p:style>
         <p:txBody>
-          <a:bodyPr rot="0" spcFirstLastPara="0" vertOverflow="overflow" horzOverflow="overflow" vert="horz" wrap="square" lIns="91440" tIns="45720" rIns="91440" bIns="45720" numCol="1" spcCol="0" rtlCol="0" fromWordArt="0" anchor="ctr" anchorCtr="0" forceAA="0" compatLnSpc="1">
-            <a:prstTxWarp prst="textNoShape">
-              <a:avLst/>
-            </a:prstTxWarp>
-            <a:noAutofit/>
+          <a:bodyPr wrap="none" rtlCol="0">
+            <a:spAutoFit/>
           </a:bodyPr>
           <a:lstStyle/>
           <a:p>
             <a:pPr algn="ctr"/>
+            <a:r>
+              <a:rPr lang="en-US" dirty="0" smtClean="0">
+                <a:latin typeface="Gill Sans"/>
+                <a:cs typeface="Gill Sans"/>
+              </a:rPr>
+              <a:t>Yelp</a:t>
+            </a:r>
+          </a:p>
+          <a:p>
+            <a:pPr algn="ctr"/>
+            <a:r>
+              <a:rPr lang="en-US" dirty="0" smtClean="0">
+                <a:latin typeface="Gill Sans"/>
+                <a:cs typeface="Gill Sans"/>
+              </a:rPr>
+              <a:t>dataset</a:t>
+            </a:r>
             <a:endParaRPr lang="en-US" dirty="0">
               <a:latin typeface="Gill Sans"/>
               <a:cs typeface="Gill Sans"/>
@@ -12585,14 +13035,14 @@
       </p:sp>
       <p:sp>
         <p:nvSpPr>
-          <p:cNvPr id="41" name="TextBox 40"/>
+          <p:cNvPr id="9" name="TextBox 8"/>
           <p:cNvSpPr txBox="1"/>
           <p:nvPr/>
         </p:nvSpPr>
         <p:spPr>
           <a:xfrm>
-            <a:off x="4986787" y="1739552"/>
-            <a:ext cx="1749423" cy="1477328"/>
+            <a:off x="6218160" y="3667933"/>
+            <a:ext cx="712780" cy="523220"/>
           </a:xfrm>
           <a:prstGeom prst="rect">
             <a:avLst/>
@@ -12600,44 +13050,877 @@
           <a:noFill/>
         </p:spPr>
         <p:txBody>
-          <a:bodyPr wrap="square" rtlCol="0">
+          <a:bodyPr wrap="none" rtlCol="0">
             <a:spAutoFit/>
           </a:bodyPr>
           <a:lstStyle/>
           <a:p>
+            <a:pPr algn="ctr"/>
             <a:r>
-              <a:rPr lang="en-US" dirty="0" smtClean="0">
+              <a:rPr lang="en-US" sz="1400" dirty="0" err="1" smtClean="0">
+                <a:solidFill>
+                  <a:schemeClr val="bg1"/>
+                </a:solidFill>
                 <a:latin typeface="Gill Sans"/>
                 <a:cs typeface="Gill Sans"/>
               </a:rPr>
-              <a:t>RECOMMENDATIONS GO HERE</a:t>
+              <a:t>Jaccard</a:t>
             </a:r>
-          </a:p>
-          <a:p>
-            <a:endParaRPr lang="en-US" dirty="0">
+            <a:endParaRPr lang="en-US" sz="1400" dirty="0" smtClean="0">
+              <a:solidFill>
+                <a:schemeClr val="bg1"/>
+              </a:solidFill>
               <a:latin typeface="Gill Sans"/>
               <a:cs typeface="Gill Sans"/>
             </a:endParaRPr>
           </a:p>
           <a:p>
+            <a:pPr algn="ctr"/>
             <a:r>
-              <a:rPr lang="en-US" dirty="0" smtClean="0">
+              <a:rPr lang="en-US" sz="1400" dirty="0" smtClean="0">
+                <a:solidFill>
+                  <a:schemeClr val="bg1"/>
+                </a:solidFill>
                 <a:latin typeface="Gill Sans"/>
                 <a:cs typeface="Gill Sans"/>
               </a:rPr>
-              <a:t>Use gills sans</a:t>
+              <a:t>0.8</a:t>
             </a:r>
-            <a:endParaRPr lang="en-US" dirty="0">
+            <a:endParaRPr lang="en-US" sz="1400" dirty="0">
+              <a:solidFill>
+                <a:schemeClr val="bg1"/>
+              </a:solidFill>
               <a:latin typeface="Gill Sans"/>
               <a:cs typeface="Gill Sans"/>
             </a:endParaRPr>
           </a:p>
         </p:txBody>
       </p:sp>
+      <p:sp>
+        <p:nvSpPr>
+          <p:cNvPr id="10" name="TextBox 9"/>
+          <p:cNvSpPr txBox="1"/>
+          <p:nvPr/>
+        </p:nvSpPr>
+        <p:spPr>
+          <a:xfrm>
+            <a:off x="7823260" y="3569718"/>
+            <a:ext cx="727045" cy="523220"/>
+          </a:xfrm>
+          <a:prstGeom prst="rect">
+            <a:avLst/>
+          </a:prstGeom>
+          <a:noFill/>
+        </p:spPr>
+        <p:txBody>
+          <a:bodyPr wrap="none" rtlCol="0">
+            <a:spAutoFit/>
+          </a:bodyPr>
+          <a:lstStyle/>
+          <a:p>
+            <a:pPr algn="ctr"/>
+            <a:r>
+              <a:rPr lang="en-US" sz="1400" dirty="0" smtClean="0">
+                <a:solidFill>
+                  <a:srgbClr val="FFFFFF"/>
+                </a:solidFill>
+                <a:latin typeface="Gill Sans"/>
+                <a:cs typeface="Gill Sans"/>
+              </a:rPr>
+              <a:t>Regex</a:t>
+            </a:r>
+          </a:p>
+          <a:p>
+            <a:pPr algn="ctr"/>
+            <a:r>
+              <a:rPr lang="en-US" sz="1400" dirty="0" smtClean="0">
+                <a:solidFill>
+                  <a:srgbClr val="FFFFFF"/>
+                </a:solidFill>
+                <a:latin typeface="Gill Sans"/>
+                <a:cs typeface="Gill Sans"/>
+              </a:rPr>
+              <a:t>(\w\d)+</a:t>
+            </a:r>
+            <a:endParaRPr lang="en-US" sz="1400" dirty="0">
+              <a:solidFill>
+                <a:srgbClr val="FFFFFF"/>
+              </a:solidFill>
+              <a:latin typeface="Gill Sans"/>
+              <a:cs typeface="Gill Sans"/>
+            </a:endParaRPr>
+          </a:p>
+        </p:txBody>
+      </p:sp>
+      <p:graphicFrame>
+        <p:nvGraphicFramePr>
+          <p:cNvPr id="11" name="Table 10"/>
+          <p:cNvGraphicFramePr>
+            <a:graphicFrameLocks noGrp="1"/>
+          </p:cNvGraphicFramePr>
+          <p:nvPr>
+            <p:extLst>
+              <p:ext uri="{D42A27DB-BD31-4B8C-83A1-F6EECF244321}">
+                <p14:modId xmlns:p14="http://schemas.microsoft.com/office/powerpoint/2010/main" val="553620244"/>
+              </p:ext>
+            </p:extLst>
+          </p:nvPr>
+        </p:nvGraphicFramePr>
+        <p:xfrm>
+          <a:off x="4619008" y="1460793"/>
+          <a:ext cx="4024688" cy="1525660"/>
+        </p:xfrm>
+        <a:graphic>
+          <a:graphicData uri="http://schemas.openxmlformats.org/drawingml/2006/table">
+            <a:tbl>
+              <a:tblPr firstRow="1" bandRow="1">
+                <a:tableStyleId>{9D7B26C5-4107-4FEC-AEDC-1716B250A1EF}</a:tableStyleId>
+              </a:tblPr>
+              <a:tblGrid>
+                <a:gridCol w="1057353"/>
+                <a:gridCol w="1449560"/>
+                <a:gridCol w="1517775"/>
+              </a:tblGrid>
+              <a:tr h="305132">
+                <a:tc>
+                  <a:txBody>
+                    <a:bodyPr/>
+                    <a:lstStyle/>
+                    <a:p>
+                      <a:r>
+                        <a:rPr lang="en-US" sz="1200" b="0" dirty="0" smtClean="0">
+                          <a:latin typeface="Gill Sans"/>
+                          <a:cs typeface="Gill Sans"/>
+                        </a:rPr>
+                        <a:t>Name</a:t>
+                      </a:r>
+                      <a:endParaRPr lang="en-US" sz="1200" b="0" dirty="0">
+                        <a:latin typeface="Gill Sans"/>
+                        <a:cs typeface="Gill Sans"/>
+                      </a:endParaRPr>
+                    </a:p>
+                  </a:txBody>
+                  <a:tcPr>
+                    <a:solidFill>
+                      <a:schemeClr val="bg1"/>
+                    </a:solidFill>
+                  </a:tcPr>
+                </a:tc>
+                <a:tc>
+                  <a:txBody>
+                    <a:bodyPr/>
+                    <a:lstStyle/>
+                    <a:p>
+                      <a:r>
+                        <a:rPr lang="en-US" sz="1200" b="0" dirty="0" smtClean="0">
+                          <a:latin typeface="Gill Sans"/>
+                          <a:cs typeface="Gill Sans"/>
+                        </a:rPr>
+                        <a:t>Address</a:t>
+                      </a:r>
+                      <a:endParaRPr lang="en-US" sz="1200" b="0" dirty="0">
+                        <a:latin typeface="Gill Sans"/>
+                        <a:cs typeface="Gill Sans"/>
+                      </a:endParaRPr>
+                    </a:p>
+                  </a:txBody>
+                  <a:tcPr>
+                    <a:solidFill>
+                      <a:schemeClr val="bg1"/>
+                    </a:solidFill>
+                  </a:tcPr>
+                </a:tc>
+                <a:tc>
+                  <a:txBody>
+                    <a:bodyPr/>
+                    <a:lstStyle/>
+                    <a:p>
+                      <a:r>
+                        <a:rPr lang="en-US" sz="1200" b="0" dirty="0" smtClean="0">
+                          <a:latin typeface="Gill Sans"/>
+                          <a:cs typeface="Gill Sans"/>
+                        </a:rPr>
+                        <a:t>Category</a:t>
+                      </a:r>
+                      <a:endParaRPr lang="en-US" sz="1200" b="0" dirty="0">
+                        <a:latin typeface="Gill Sans"/>
+                        <a:cs typeface="Gill Sans"/>
+                      </a:endParaRPr>
+                    </a:p>
+                  </a:txBody>
+                  <a:tcPr>
+                    <a:solidFill>
+                      <a:schemeClr val="bg1"/>
+                    </a:solidFill>
+                  </a:tcPr>
+                </a:tc>
+              </a:tr>
+              <a:tr h="305132">
+                <a:tc>
+                  <a:txBody>
+                    <a:bodyPr/>
+                    <a:lstStyle/>
+                    <a:p>
+                      <a:r>
+                        <a:rPr lang="en-US" sz="1200" b="0" dirty="0" smtClean="0">
+                          <a:solidFill>
+                            <a:schemeClr val="tx1">
+                              <a:lumMod val="95000"/>
+                              <a:lumOff val="5000"/>
+                            </a:schemeClr>
+                          </a:solidFill>
+                          <a:latin typeface="Gill Sans"/>
+                          <a:cs typeface="Gill Sans"/>
+                        </a:rPr>
+                        <a:t>Carl’s Junior</a:t>
+                      </a:r>
+                      <a:endParaRPr lang="en-US" sz="1200" b="0" dirty="0">
+                        <a:solidFill>
+                          <a:schemeClr val="tx1">
+                            <a:lumMod val="95000"/>
+                            <a:lumOff val="5000"/>
+                          </a:schemeClr>
+                        </a:solidFill>
+                        <a:latin typeface="Gill Sans"/>
+                        <a:cs typeface="Gill Sans"/>
+                      </a:endParaRPr>
+                    </a:p>
+                  </a:txBody>
+                  <a:tcPr>
+                    <a:solidFill>
+                      <a:schemeClr val="bg1">
+                        <a:lumMod val="85000"/>
+                      </a:schemeClr>
+                    </a:solidFill>
+                  </a:tcPr>
+                </a:tc>
+                <a:tc>
+                  <a:txBody>
+                    <a:bodyPr/>
+                    <a:lstStyle/>
+                    <a:p>
+                      <a:r>
+                        <a:rPr lang="en-US" sz="1200" b="0" dirty="0" smtClean="0">
+                          <a:solidFill>
+                            <a:schemeClr val="tx1">
+                              <a:lumMod val="95000"/>
+                              <a:lumOff val="5000"/>
+                            </a:schemeClr>
+                          </a:solidFill>
+                          <a:latin typeface="Gill Sans"/>
+                          <a:cs typeface="Gill Sans"/>
+                        </a:rPr>
+                        <a:t>2132</a:t>
+                      </a:r>
+                      <a:r>
+                        <a:rPr lang="en-US" sz="1200" b="0" baseline="0" dirty="0" smtClean="0">
+                          <a:solidFill>
+                            <a:schemeClr val="tx1">
+                              <a:lumMod val="95000"/>
+                              <a:lumOff val="5000"/>
+                            </a:schemeClr>
+                          </a:solidFill>
+                          <a:latin typeface="Gill Sans"/>
+                          <a:cs typeface="Gill Sans"/>
+                        </a:rPr>
+                        <a:t> E Hayward.</a:t>
+                      </a:r>
+                      <a:endParaRPr lang="en-US" sz="1200" b="0" dirty="0">
+                        <a:solidFill>
+                          <a:schemeClr val="tx1">
+                            <a:lumMod val="95000"/>
+                            <a:lumOff val="5000"/>
+                          </a:schemeClr>
+                        </a:solidFill>
+                        <a:latin typeface="Gill Sans"/>
+                        <a:cs typeface="Gill Sans"/>
+                      </a:endParaRPr>
+                    </a:p>
+                  </a:txBody>
+                  <a:tcPr>
+                    <a:solidFill>
+                      <a:schemeClr val="bg1">
+                        <a:lumMod val="85000"/>
+                      </a:schemeClr>
+                    </a:solidFill>
+                  </a:tcPr>
+                </a:tc>
+                <a:tc>
+                  <a:txBody>
+                    <a:bodyPr/>
+                    <a:lstStyle/>
+                    <a:p>
+                      <a:r>
+                        <a:rPr lang="en-US" sz="1200" b="0" dirty="0" smtClean="0">
+                          <a:solidFill>
+                            <a:schemeClr val="tx1">
+                              <a:lumMod val="95000"/>
+                              <a:lumOff val="5000"/>
+                            </a:schemeClr>
+                          </a:solidFill>
+                          <a:latin typeface="Gill Sans"/>
+                          <a:cs typeface="Gill Sans"/>
+                        </a:rPr>
+                        <a:t>Fast Food American</a:t>
+                      </a:r>
+                      <a:endParaRPr lang="en-US" sz="1200" b="0" dirty="0">
+                        <a:solidFill>
+                          <a:schemeClr val="tx1">
+                            <a:lumMod val="95000"/>
+                            <a:lumOff val="5000"/>
+                          </a:schemeClr>
+                        </a:solidFill>
+                        <a:latin typeface="Gill Sans"/>
+                        <a:cs typeface="Gill Sans"/>
+                      </a:endParaRPr>
+                    </a:p>
+                  </a:txBody>
+                  <a:tcPr>
+                    <a:solidFill>
+                      <a:schemeClr val="bg1">
+                        <a:lumMod val="85000"/>
+                      </a:schemeClr>
+                    </a:solidFill>
+                  </a:tcPr>
+                </a:tc>
+              </a:tr>
+              <a:tr h="305132">
+                <a:tc>
+                  <a:txBody>
+                    <a:bodyPr/>
+                    <a:lstStyle/>
+                    <a:p>
+                      <a:r>
+                        <a:rPr lang="en-US" sz="1200" b="0" dirty="0" smtClean="0">
+                          <a:solidFill>
+                            <a:schemeClr val="tx1">
+                              <a:lumMod val="95000"/>
+                              <a:lumOff val="5000"/>
+                            </a:schemeClr>
+                          </a:solidFill>
+                          <a:latin typeface="Gill Sans"/>
+                          <a:cs typeface="Gill Sans"/>
+                        </a:rPr>
+                        <a:t>Peking</a:t>
+                      </a:r>
+                      <a:r>
+                        <a:rPr lang="en-US" sz="1200" b="0" baseline="0" dirty="0" smtClean="0">
+                          <a:solidFill>
+                            <a:schemeClr val="tx1">
+                              <a:lumMod val="95000"/>
+                              <a:lumOff val="5000"/>
+                            </a:schemeClr>
+                          </a:solidFill>
+                          <a:latin typeface="Gill Sans"/>
+                          <a:cs typeface="Gill Sans"/>
+                        </a:rPr>
+                        <a:t> Star</a:t>
+                      </a:r>
+                      <a:endParaRPr lang="en-US" sz="1200" b="0" dirty="0">
+                        <a:solidFill>
+                          <a:schemeClr val="tx1">
+                            <a:lumMod val="95000"/>
+                            <a:lumOff val="5000"/>
+                          </a:schemeClr>
+                        </a:solidFill>
+                        <a:latin typeface="Gill Sans"/>
+                        <a:cs typeface="Gill Sans"/>
+                      </a:endParaRPr>
+                    </a:p>
+                  </a:txBody>
+                  <a:tcPr>
+                    <a:solidFill>
+                      <a:schemeClr val="bg1"/>
+                    </a:solidFill>
+                  </a:tcPr>
+                </a:tc>
+                <a:tc>
+                  <a:txBody>
+                    <a:bodyPr/>
+                    <a:lstStyle/>
+                    <a:p>
+                      <a:r>
+                        <a:rPr lang="en-US" sz="1200" b="0" dirty="0" smtClean="0">
+                          <a:solidFill>
+                            <a:schemeClr val="tx1">
+                              <a:lumMod val="95000"/>
+                              <a:lumOff val="5000"/>
+                            </a:schemeClr>
+                          </a:solidFill>
+                          <a:latin typeface="Gill Sans"/>
+                          <a:cs typeface="Gill Sans"/>
+                        </a:rPr>
+                        <a:t>102 </a:t>
+                      </a:r>
+                      <a:r>
+                        <a:rPr lang="en-US" sz="1200" b="0" dirty="0" err="1" smtClean="0">
+                          <a:solidFill>
+                            <a:schemeClr val="tx1">
+                              <a:lumMod val="95000"/>
+                              <a:lumOff val="5000"/>
+                            </a:schemeClr>
+                          </a:solidFill>
+                          <a:latin typeface="Gill Sans"/>
+                          <a:cs typeface="Gill Sans"/>
+                        </a:rPr>
+                        <a:t>Bayshore</a:t>
+                      </a:r>
+                      <a:r>
+                        <a:rPr lang="en-US" sz="1200" b="0" dirty="0" smtClean="0">
+                          <a:solidFill>
+                            <a:schemeClr val="tx1">
+                              <a:lumMod val="95000"/>
+                              <a:lumOff val="5000"/>
+                            </a:schemeClr>
+                          </a:solidFill>
+                          <a:latin typeface="Gill Sans"/>
+                          <a:cs typeface="Gill Sans"/>
+                        </a:rPr>
+                        <a:t> </a:t>
+                      </a:r>
+                      <a:r>
+                        <a:rPr lang="en-US" sz="1200" b="0" dirty="0" err="1" smtClean="0">
+                          <a:solidFill>
+                            <a:schemeClr val="tx1">
+                              <a:lumMod val="95000"/>
+                              <a:lumOff val="5000"/>
+                            </a:schemeClr>
+                          </a:solidFill>
+                          <a:latin typeface="Gill Sans"/>
+                          <a:cs typeface="Gill Sans"/>
+                        </a:rPr>
+                        <a:t>Dr</a:t>
+                      </a:r>
+                      <a:r>
+                        <a:rPr lang="en-US" sz="1200" b="0" dirty="0" smtClean="0">
+                          <a:solidFill>
+                            <a:schemeClr val="tx1">
+                              <a:lumMod val="95000"/>
+                              <a:lumOff val="5000"/>
+                            </a:schemeClr>
+                          </a:solidFill>
+                          <a:latin typeface="Gill Sans"/>
+                          <a:cs typeface="Gill Sans"/>
+                        </a:rPr>
+                        <a:t>…</a:t>
+                      </a:r>
+                      <a:endParaRPr lang="en-US" sz="1200" b="0" dirty="0">
+                        <a:solidFill>
+                          <a:schemeClr val="tx1">
+                            <a:lumMod val="95000"/>
+                            <a:lumOff val="5000"/>
+                          </a:schemeClr>
+                        </a:solidFill>
+                        <a:latin typeface="Gill Sans"/>
+                        <a:cs typeface="Gill Sans"/>
+                      </a:endParaRPr>
+                    </a:p>
+                  </a:txBody>
+                  <a:tcPr>
+                    <a:solidFill>
+                      <a:schemeClr val="bg1"/>
+                    </a:solidFill>
+                  </a:tcPr>
+                </a:tc>
+                <a:tc>
+                  <a:txBody>
+                    <a:bodyPr/>
+                    <a:lstStyle/>
+                    <a:p>
+                      <a:endParaRPr lang="en-US" sz="1200" b="0" dirty="0">
+                        <a:solidFill>
+                          <a:schemeClr val="tx1">
+                            <a:lumMod val="95000"/>
+                            <a:lumOff val="5000"/>
+                          </a:schemeClr>
+                        </a:solidFill>
+                        <a:latin typeface="Gill Sans"/>
+                        <a:cs typeface="Gill Sans"/>
+                      </a:endParaRPr>
+                    </a:p>
+                  </a:txBody>
+                  <a:tcPr>
+                    <a:solidFill>
+                      <a:schemeClr val="bg1"/>
+                    </a:solidFill>
+                  </a:tcPr>
+                </a:tc>
+              </a:tr>
+              <a:tr h="305132">
+                <a:tc>
+                  <a:txBody>
+                    <a:bodyPr/>
+                    <a:lstStyle/>
+                    <a:p>
+                      <a:r>
+                        <a:rPr lang="en-US" sz="1200" b="0" dirty="0" smtClean="0">
+                          <a:solidFill>
+                            <a:schemeClr val="tx1">
+                              <a:lumMod val="95000"/>
+                              <a:lumOff val="5000"/>
+                            </a:schemeClr>
+                          </a:solidFill>
+                          <a:latin typeface="Gill Sans"/>
+                          <a:cs typeface="Gill Sans"/>
+                        </a:rPr>
+                        <a:t>Peking Star</a:t>
+                      </a:r>
+                      <a:endParaRPr lang="en-US" sz="1200" b="0" dirty="0">
+                        <a:solidFill>
+                          <a:schemeClr val="tx1">
+                            <a:lumMod val="95000"/>
+                            <a:lumOff val="5000"/>
+                          </a:schemeClr>
+                        </a:solidFill>
+                        <a:latin typeface="Gill Sans"/>
+                        <a:cs typeface="Gill Sans"/>
+                      </a:endParaRPr>
+                    </a:p>
+                  </a:txBody>
+                  <a:tcPr>
+                    <a:solidFill>
+                      <a:srgbClr val="D9D9D9"/>
+                    </a:solidFill>
+                  </a:tcPr>
+                </a:tc>
+                <a:tc>
+                  <a:txBody>
+                    <a:bodyPr/>
+                    <a:lstStyle/>
+                    <a:p>
+                      <a:pPr marL="0" marR="0" indent="0" algn="l" defTabSz="457200" rtl="0" eaLnBrk="1" fontAlgn="auto" latinLnBrk="0" hangingPunct="1">
+                        <a:lnSpc>
+                          <a:spcPct val="100000"/>
+                        </a:lnSpc>
+                        <a:spcBef>
+                          <a:spcPts val="0"/>
+                        </a:spcBef>
+                        <a:spcAft>
+                          <a:spcPts val="0"/>
+                        </a:spcAft>
+                        <a:buClrTx/>
+                        <a:buSzTx/>
+                        <a:buFontTx/>
+                        <a:buNone/>
+                        <a:tabLst/>
+                        <a:defRPr/>
+                      </a:pPr>
+                      <a:r>
+                        <a:rPr lang="en-US" sz="1200" b="0" dirty="0" smtClean="0">
+                          <a:solidFill>
+                            <a:schemeClr val="tx1">
+                              <a:lumMod val="95000"/>
+                              <a:lumOff val="5000"/>
+                            </a:schemeClr>
+                          </a:solidFill>
+                          <a:latin typeface="Gill Sans"/>
+                          <a:cs typeface="Gill Sans"/>
+                        </a:rPr>
+                        <a:t>102 </a:t>
+                      </a:r>
+                      <a:r>
+                        <a:rPr lang="en-US" sz="1200" b="0" dirty="0" err="1" smtClean="0">
+                          <a:solidFill>
+                            <a:schemeClr val="tx1">
+                              <a:lumMod val="95000"/>
+                              <a:lumOff val="5000"/>
+                            </a:schemeClr>
+                          </a:solidFill>
+                          <a:latin typeface="Gill Sans"/>
+                          <a:cs typeface="Gill Sans"/>
+                        </a:rPr>
+                        <a:t>Bayshore</a:t>
+                      </a:r>
+                      <a:r>
+                        <a:rPr lang="en-US" sz="1200" b="0" dirty="0" smtClean="0">
+                          <a:solidFill>
+                            <a:schemeClr val="tx1">
+                              <a:lumMod val="95000"/>
+                              <a:lumOff val="5000"/>
+                            </a:schemeClr>
+                          </a:solidFill>
+                          <a:latin typeface="Gill Sans"/>
+                          <a:cs typeface="Gill Sans"/>
+                        </a:rPr>
+                        <a:t> </a:t>
+                      </a:r>
+                      <a:r>
+                        <a:rPr lang="en-US" sz="1200" b="0" dirty="0" err="1" smtClean="0">
+                          <a:solidFill>
+                            <a:schemeClr val="tx1">
+                              <a:lumMod val="95000"/>
+                              <a:lumOff val="5000"/>
+                            </a:schemeClr>
+                          </a:solidFill>
+                          <a:latin typeface="Gill Sans"/>
+                          <a:cs typeface="Gill Sans"/>
+                        </a:rPr>
+                        <a:t>Dr</a:t>
+                      </a:r>
+                      <a:r>
+                        <a:rPr lang="en-US" sz="1200" b="0" dirty="0" smtClean="0">
+                          <a:solidFill>
+                            <a:schemeClr val="tx1">
+                              <a:lumMod val="95000"/>
+                              <a:lumOff val="5000"/>
+                            </a:schemeClr>
+                          </a:solidFill>
+                          <a:latin typeface="Gill Sans"/>
+                          <a:cs typeface="Gill Sans"/>
+                        </a:rPr>
+                        <a:t>…</a:t>
+                      </a:r>
+                    </a:p>
+                  </a:txBody>
+                  <a:tcPr>
+                    <a:solidFill>
+                      <a:srgbClr val="D9D9D9"/>
+                    </a:solidFill>
+                  </a:tcPr>
+                </a:tc>
+                <a:tc>
+                  <a:txBody>
+                    <a:bodyPr/>
+                    <a:lstStyle/>
+                    <a:p>
+                      <a:r>
+                        <a:rPr lang="en-US" sz="1200" b="0" dirty="0" smtClean="0">
+                          <a:solidFill>
+                            <a:schemeClr val="tx1">
+                              <a:lumMod val="95000"/>
+                              <a:lumOff val="5000"/>
+                            </a:schemeClr>
+                          </a:solidFill>
+                          <a:latin typeface="Gill Sans"/>
+                          <a:cs typeface="Gill Sans"/>
+                        </a:rPr>
+                        <a:t>Chinese</a:t>
+                      </a:r>
+                      <a:endParaRPr lang="en-US" sz="1200" b="0" dirty="0">
+                        <a:solidFill>
+                          <a:schemeClr val="tx1">
+                            <a:lumMod val="95000"/>
+                            <a:lumOff val="5000"/>
+                          </a:schemeClr>
+                        </a:solidFill>
+                        <a:latin typeface="Gill Sans"/>
+                        <a:cs typeface="Gill Sans"/>
+                      </a:endParaRPr>
+                    </a:p>
+                  </a:txBody>
+                  <a:tcPr>
+                    <a:solidFill>
+                      <a:srgbClr val="D9D9D9"/>
+                    </a:solidFill>
+                  </a:tcPr>
+                </a:tc>
+              </a:tr>
+              <a:tr h="305132">
+                <a:tc>
+                  <a:txBody>
+                    <a:bodyPr/>
+                    <a:lstStyle/>
+                    <a:p>
+                      <a:r>
+                        <a:rPr lang="en-US" sz="1200" b="0" dirty="0" smtClean="0">
+                          <a:solidFill>
+                            <a:schemeClr val="tx1">
+                              <a:lumMod val="95000"/>
+                              <a:lumOff val="5000"/>
+                            </a:schemeClr>
+                          </a:solidFill>
+                          <a:latin typeface="Gill Sans"/>
+                          <a:cs typeface="Gill Sans"/>
+                        </a:rPr>
+                        <a:t>Flag Cafe</a:t>
+                      </a:r>
+                      <a:endParaRPr lang="en-US" sz="1200" b="0" dirty="0">
+                        <a:solidFill>
+                          <a:schemeClr val="tx1">
+                            <a:lumMod val="95000"/>
+                            <a:lumOff val="5000"/>
+                          </a:schemeClr>
+                        </a:solidFill>
+                        <a:latin typeface="Gill Sans"/>
+                        <a:cs typeface="Gill Sans"/>
+                      </a:endParaRPr>
+                    </a:p>
+                  </a:txBody>
+                  <a:tcPr>
+                    <a:solidFill>
+                      <a:schemeClr val="bg1"/>
+                    </a:solidFill>
+                  </a:tcPr>
+                </a:tc>
+                <a:tc>
+                  <a:txBody>
+                    <a:bodyPr/>
+                    <a:lstStyle/>
+                    <a:p>
+                      <a:r>
+                        <a:rPr lang="en-US" sz="1200" b="0" dirty="0" smtClean="0">
+                          <a:solidFill>
+                            <a:schemeClr val="tx1">
+                              <a:lumMod val="95000"/>
+                              <a:lumOff val="5000"/>
+                            </a:schemeClr>
+                          </a:solidFill>
+                          <a:latin typeface="Gill Sans"/>
+                          <a:cs typeface="Gill Sans"/>
+                        </a:rPr>
+                        <a:t>192 Courtyard W..</a:t>
+                      </a:r>
+                      <a:endParaRPr lang="en-US" sz="1200" b="0" dirty="0">
+                        <a:solidFill>
+                          <a:schemeClr val="tx1">
+                            <a:lumMod val="95000"/>
+                            <a:lumOff val="5000"/>
+                          </a:schemeClr>
+                        </a:solidFill>
+                        <a:latin typeface="Gill Sans"/>
+                        <a:cs typeface="Gill Sans"/>
+                      </a:endParaRPr>
+                    </a:p>
+                  </a:txBody>
+                  <a:tcPr>
+                    <a:solidFill>
+                      <a:schemeClr val="bg1"/>
+                    </a:solidFill>
+                  </a:tcPr>
+                </a:tc>
+                <a:tc>
+                  <a:txBody>
+                    <a:bodyPr/>
+                    <a:lstStyle/>
+                    <a:p>
+                      <a:r>
+                        <a:rPr lang="en-US" sz="1200" b="0" dirty="0" smtClean="0">
+                          <a:solidFill>
+                            <a:schemeClr val="tx1">
+                              <a:lumMod val="95000"/>
+                              <a:lumOff val="5000"/>
+                            </a:schemeClr>
+                          </a:solidFill>
+                          <a:latin typeface="Gill Sans"/>
+                          <a:cs typeface="Gill Sans"/>
+                        </a:rPr>
+                        <a:t>Coffee</a:t>
+                      </a:r>
+                      <a:r>
+                        <a:rPr lang="en-US" sz="1200" b="0" baseline="0" dirty="0" smtClean="0">
+                          <a:solidFill>
+                            <a:schemeClr val="tx1">
+                              <a:lumMod val="95000"/>
+                              <a:lumOff val="5000"/>
+                            </a:schemeClr>
+                          </a:solidFill>
+                          <a:latin typeface="Gill Sans"/>
+                          <a:cs typeface="Gill Sans"/>
+                        </a:rPr>
+                        <a:t> Shop</a:t>
+                      </a:r>
+                      <a:endParaRPr lang="en-US" sz="1200" b="0" dirty="0">
+                        <a:solidFill>
+                          <a:schemeClr val="tx1">
+                            <a:lumMod val="95000"/>
+                            <a:lumOff val="5000"/>
+                          </a:schemeClr>
+                        </a:solidFill>
+                        <a:latin typeface="Gill Sans"/>
+                        <a:cs typeface="Gill Sans"/>
+                      </a:endParaRPr>
+                    </a:p>
+                  </a:txBody>
+                  <a:tcPr>
+                    <a:solidFill>
+                      <a:schemeClr val="bg1"/>
+                    </a:solidFill>
+                  </a:tcPr>
+                </a:tc>
+              </a:tr>
+            </a:tbl>
+          </a:graphicData>
+        </a:graphic>
+      </p:graphicFrame>
+      <p:sp>
+        <p:nvSpPr>
+          <p:cNvPr id="12" name="TextBox 11"/>
+          <p:cNvSpPr txBox="1"/>
+          <p:nvPr/>
+        </p:nvSpPr>
+        <p:spPr>
+          <a:xfrm>
+            <a:off x="642209" y="1411950"/>
+            <a:ext cx="2517787" cy="400110"/>
+          </a:xfrm>
+          <a:prstGeom prst="rect">
+            <a:avLst/>
+          </a:prstGeom>
+          <a:noFill/>
+        </p:spPr>
+        <p:txBody>
+          <a:bodyPr wrap="none" rtlCol="0">
+            <a:spAutoFit/>
+          </a:bodyPr>
+          <a:lstStyle/>
+          <a:p>
+            <a:r>
+              <a:rPr lang="en-US" sz="2000" dirty="0" smtClean="0">
+                <a:latin typeface="Gill Sans"/>
+                <a:cs typeface="Gill Sans"/>
+              </a:rPr>
+              <a:t>Data Cleaning Pipeline</a:t>
+            </a:r>
+            <a:endParaRPr lang="en-US" sz="2000" dirty="0">
+              <a:latin typeface="Gill Sans"/>
+              <a:cs typeface="Gill Sans"/>
+            </a:endParaRPr>
+          </a:p>
+        </p:txBody>
+      </p:sp>
+      <p:pic>
+        <p:nvPicPr>
+          <p:cNvPr id="24" name="Picture 23"/>
+          <p:cNvPicPr>
+            <a:picLocks noChangeAspect="1"/>
+          </p:cNvPicPr>
+          <p:nvPr/>
+        </p:nvPicPr>
+        <p:blipFill>
+          <a:blip r:embed="rId2">
+            <a:extLst>
+              <a:ext uri="{BEBA8EAE-BF5A-486C-A8C5-ECC9F3942E4B}">
+                <a14:imgProps xmlns:a14="http://schemas.microsoft.com/office/drawing/2010/main">
+                  <a14:imgLayer r:embed="rId3">
+                    <a14:imgEffect>
+                      <a14:sharpenSoften amount="50000"/>
+                    </a14:imgEffect>
+                    <a14:imgEffect>
+                      <a14:brightnessContrast contrast="-40000"/>
+                    </a14:imgEffect>
+                  </a14:imgLayer>
+                </a14:imgProps>
+              </a:ext>
+            </a:extLst>
+          </a:blip>
+          <a:stretch>
+            <a:fillRect/>
+          </a:stretch>
+        </p:blipFill>
+        <p:spPr>
+          <a:xfrm>
+            <a:off x="97692" y="1803894"/>
+            <a:ext cx="4457278" cy="2404154"/>
+          </a:xfrm>
+          <a:prstGeom prst="rect">
+            <a:avLst/>
+          </a:prstGeom>
+        </p:spPr>
+      </p:pic>
     </p:spTree>
     <p:extLst>
       <p:ext uri="{BB962C8B-B14F-4D97-AF65-F5344CB8AC3E}">
-        <p14:creationId xmlns:p14="http://schemas.microsoft.com/office/powerpoint/2010/main" val="2991822472"/>
+        <p14:creationId xmlns:p14="http://schemas.microsoft.com/office/powerpoint/2010/main" val="1263859949"/>
       </p:ext>
     </p:extLst>
   </p:cSld>

</xml_diff>

<commit_message>
fixed dashboard to use zagat
</commit_message>
<xml_diff>
--- a/figs/screenshot_diagrams.pptx
+++ b/figs/screenshot_diagrams.pptx
@@ -5843,7 +5843,7 @@
           <a:p>
             <a:fld id="{892A0D87-FD87-6841-9FB4-6C718EABD70C}" type="datetimeFigureOut">
               <a:rPr lang="en-US" smtClean="0"/>
-              <a:t>3/26/15</a:t>
+              <a:t>3/27/15</a:t>
             </a:fld>
             <a:endParaRPr lang="en-US"/>
           </a:p>
@@ -6013,7 +6013,7 @@
           <a:p>
             <a:fld id="{892A0D87-FD87-6841-9FB4-6C718EABD70C}" type="datetimeFigureOut">
               <a:rPr lang="en-US" smtClean="0"/>
-              <a:t>3/26/15</a:t>
+              <a:t>3/27/15</a:t>
             </a:fld>
             <a:endParaRPr lang="en-US"/>
           </a:p>
@@ -6193,7 +6193,7 @@
           <a:p>
             <a:fld id="{892A0D87-FD87-6841-9FB4-6C718EABD70C}" type="datetimeFigureOut">
               <a:rPr lang="en-US" smtClean="0"/>
-              <a:t>3/26/15</a:t>
+              <a:t>3/27/15</a:t>
             </a:fld>
             <a:endParaRPr lang="en-US"/>
           </a:p>
@@ -6363,7 +6363,7 @@
           <a:p>
             <a:fld id="{892A0D87-FD87-6841-9FB4-6C718EABD70C}" type="datetimeFigureOut">
               <a:rPr lang="en-US" smtClean="0"/>
-              <a:t>3/26/15</a:t>
+              <a:t>3/27/15</a:t>
             </a:fld>
             <a:endParaRPr lang="en-US"/>
           </a:p>
@@ -6609,7 +6609,7 @@
           <a:p>
             <a:fld id="{892A0D87-FD87-6841-9FB4-6C718EABD70C}" type="datetimeFigureOut">
               <a:rPr lang="en-US" smtClean="0"/>
-              <a:t>3/26/15</a:t>
+              <a:t>3/27/15</a:t>
             </a:fld>
             <a:endParaRPr lang="en-US"/>
           </a:p>
@@ -6897,7 +6897,7 @@
           <a:p>
             <a:fld id="{892A0D87-FD87-6841-9FB4-6C718EABD70C}" type="datetimeFigureOut">
               <a:rPr lang="en-US" smtClean="0"/>
-              <a:t>3/26/15</a:t>
+              <a:t>3/27/15</a:t>
             </a:fld>
             <a:endParaRPr lang="en-US"/>
           </a:p>
@@ -7319,7 +7319,7 @@
           <a:p>
             <a:fld id="{892A0D87-FD87-6841-9FB4-6C718EABD70C}" type="datetimeFigureOut">
               <a:rPr lang="en-US" smtClean="0"/>
-              <a:t>3/26/15</a:t>
+              <a:t>3/27/15</a:t>
             </a:fld>
             <a:endParaRPr lang="en-US"/>
           </a:p>
@@ -7437,7 +7437,7 @@
           <a:p>
             <a:fld id="{892A0D87-FD87-6841-9FB4-6C718EABD70C}" type="datetimeFigureOut">
               <a:rPr lang="en-US" smtClean="0"/>
-              <a:t>3/26/15</a:t>
+              <a:t>3/27/15</a:t>
             </a:fld>
             <a:endParaRPr lang="en-US"/>
           </a:p>
@@ -7532,7 +7532,7 @@
           <a:p>
             <a:fld id="{892A0D87-FD87-6841-9FB4-6C718EABD70C}" type="datetimeFigureOut">
               <a:rPr lang="en-US" smtClean="0"/>
-              <a:t>3/26/15</a:t>
+              <a:t>3/27/15</a:t>
             </a:fld>
             <a:endParaRPr lang="en-US"/>
           </a:p>
@@ -7809,7 +7809,7 @@
           <a:p>
             <a:fld id="{892A0D87-FD87-6841-9FB4-6C718EABD70C}" type="datetimeFigureOut">
               <a:rPr lang="en-US" smtClean="0"/>
-              <a:t>3/26/15</a:t>
+              <a:t>3/27/15</a:t>
             </a:fld>
             <a:endParaRPr lang="en-US"/>
           </a:p>
@@ -8062,7 +8062,7 @@
           <a:p>
             <a:fld id="{892A0D87-FD87-6841-9FB4-6C718EABD70C}" type="datetimeFigureOut">
               <a:rPr lang="en-US" smtClean="0"/>
-              <a:t>3/26/15</a:t>
+              <a:t>3/27/15</a:t>
             </a:fld>
             <a:endParaRPr lang="en-US"/>
           </a:p>
@@ -8275,7 +8275,7 @@
           <a:p>
             <a:fld id="{892A0D87-FD87-6841-9FB4-6C718EABD70C}" type="datetimeFigureOut">
               <a:rPr lang="en-US" smtClean="0"/>
-              <a:t>3/26/15</a:t>
+              <a:t>3/27/15</a:t>
             </a:fld>
             <a:endParaRPr lang="en-US"/>
           </a:p>
@@ -10825,8 +10825,12 @@
                 <a:latin typeface="Gill Sans"/>
                 <a:cs typeface="Gill Sans"/>
               </a:rPr>
-              <a:t>Yelp</a:t>
+              <a:t>Zagat</a:t>
             </a:r>
+            <a:endParaRPr lang="en-US" dirty="0" smtClean="0">
+              <a:latin typeface="Gill Sans"/>
+              <a:cs typeface="Gill Sans"/>
+            </a:endParaRPr>
           </a:p>
           <a:p>
             <a:pPr algn="ctr"/>
@@ -12801,6 +12805,90 @@
           <a:chExt cx="0" cy="0"/>
         </a:xfrm>
       </p:grpSpPr>
+      <p:pic>
+        <p:nvPicPr>
+          <p:cNvPr id="24" name="Picture 23"/>
+          <p:cNvPicPr>
+            <a:picLocks noChangeAspect="1"/>
+          </p:cNvPicPr>
+          <p:nvPr/>
+        </p:nvPicPr>
+        <p:blipFill>
+          <a:blip r:embed="rId2">
+            <a:extLst>
+              <a:ext uri="{BEBA8EAE-BF5A-486C-A8C5-ECC9F3942E4B}">
+                <a14:imgProps xmlns:a14="http://schemas.microsoft.com/office/drawing/2010/main">
+                  <a14:imgLayer r:embed="rId3">
+                    <a14:imgEffect>
+                      <a14:sharpenSoften amount="50000"/>
+                    </a14:imgEffect>
+                    <a14:imgEffect>
+                      <a14:brightnessContrast contrast="-40000"/>
+                    </a14:imgEffect>
+                  </a14:imgLayer>
+                </a14:imgProps>
+              </a:ext>
+            </a:extLst>
+          </a:blip>
+          <a:stretch>
+            <a:fillRect/>
+          </a:stretch>
+        </p:blipFill>
+        <p:spPr>
+          <a:xfrm>
+            <a:off x="97692" y="1803894"/>
+            <a:ext cx="4457278" cy="2404154"/>
+          </a:xfrm>
+          <a:prstGeom prst="rect">
+            <a:avLst/>
+          </a:prstGeom>
+        </p:spPr>
+      </p:pic>
+      <p:sp>
+        <p:nvSpPr>
+          <p:cNvPr id="3" name="Rectangle 2"/>
+          <p:cNvSpPr/>
+          <p:nvPr/>
+        </p:nvSpPr>
+        <p:spPr>
+          <a:xfrm>
+            <a:off x="771769" y="2276231"/>
+            <a:ext cx="3243385" cy="710222"/>
+          </a:xfrm>
+          <a:prstGeom prst="rect">
+            <a:avLst/>
+          </a:prstGeom>
+          <a:solidFill>
+            <a:schemeClr val="bg1"/>
+          </a:solidFill>
+          <a:ln>
+            <a:noFill/>
+          </a:ln>
+          <a:effectLst/>
+        </p:spPr>
+        <p:style>
+          <a:lnRef idx="1">
+            <a:schemeClr val="accent1"/>
+          </a:lnRef>
+          <a:fillRef idx="3">
+            <a:schemeClr val="accent1"/>
+          </a:fillRef>
+          <a:effectRef idx="2">
+            <a:schemeClr val="accent1"/>
+          </a:effectRef>
+          <a:fontRef idx="minor">
+            <a:schemeClr val="lt1"/>
+          </a:fontRef>
+        </p:style>
+        <p:txBody>
+          <a:bodyPr rtlCol="0" anchor="ctr"/>
+          <a:lstStyle/>
+          <a:p>
+            <a:pPr algn="ctr"/>
+            <a:endParaRPr lang="en-US"/>
+          </a:p>
+        </p:txBody>
+      </p:sp>
       <p:sp>
         <p:nvSpPr>
           <p:cNvPr id="4" name="Rectangular Callout 3"/>
@@ -13014,8 +13102,12 @@
                 <a:latin typeface="Gill Sans"/>
                 <a:cs typeface="Gill Sans"/>
               </a:rPr>
-              <a:t>Yelp</a:t>
+              <a:t>Zagat</a:t>
             </a:r>
+            <a:endParaRPr lang="en-US" dirty="0" smtClean="0">
+              <a:latin typeface="Gill Sans"/>
+              <a:cs typeface="Gill Sans"/>
+            </a:endParaRPr>
           </a:p>
           <a:p>
             <a:pPr algn="ctr"/>
@@ -13878,45 +13970,106 @@
           </a:p>
         </p:txBody>
       </p:sp>
-      <p:pic>
-        <p:nvPicPr>
-          <p:cNvPr id="24" name="Picture 23"/>
-          <p:cNvPicPr>
-            <a:picLocks noChangeAspect="1"/>
-          </p:cNvPicPr>
+      <p:sp>
+        <p:nvSpPr>
+          <p:cNvPr id="2" name="TextBox 1"/>
+          <p:cNvSpPr txBox="1"/>
           <p:nvPr/>
-        </p:nvPicPr>
-        <p:blipFill>
-          <a:blip r:embed="rId2">
-            <a:extLst>
-              <a:ext uri="{BEBA8EAE-BF5A-486C-A8C5-ECC9F3942E4B}">
-                <a14:imgProps xmlns:a14="http://schemas.microsoft.com/office/drawing/2010/main">
-                  <a14:imgLayer r:embed="rId3">
-                    <a14:imgEffect>
-                      <a14:sharpenSoften amount="50000"/>
-                    </a14:imgEffect>
-                    <a14:imgEffect>
-                      <a14:brightnessContrast contrast="-40000"/>
-                    </a14:imgEffect>
-                  </a14:imgLayer>
-                </a14:imgProps>
-              </a:ext>
-            </a:extLst>
-          </a:blip>
-          <a:stretch>
-            <a:fillRect/>
-          </a:stretch>
-        </p:blipFill>
+        </p:nvSpPr>
         <p:spPr>
           <a:xfrm>
-            <a:off x="97692" y="1803894"/>
-            <a:ext cx="4457278" cy="2404154"/>
+            <a:off x="859693" y="2188311"/>
+            <a:ext cx="2862683" cy="646331"/>
           </a:xfrm>
           <a:prstGeom prst="rect">
             <a:avLst/>
           </a:prstGeom>
+          <a:noFill/>
         </p:spPr>
-      </p:pic>
+        <p:txBody>
+          <a:bodyPr wrap="none" rtlCol="0">
+            <a:spAutoFit/>
+          </a:bodyPr>
+          <a:lstStyle/>
+          <a:p>
+            <a:r>
+              <a:rPr lang="en-US" sz="1200" dirty="0" err="1" smtClean="0">
+                <a:latin typeface="Courier New"/>
+                <a:cs typeface="Courier New"/>
+              </a:rPr>
+              <a:t>SimilarityJoin</a:t>
+            </a:r>
+            <a:endParaRPr lang="en-US" sz="1200" dirty="0" smtClean="0">
+              <a:latin typeface="Courier New"/>
+              <a:cs typeface="Courier New"/>
+            </a:endParaRPr>
+          </a:p>
+          <a:p>
+            <a:r>
+              <a:rPr lang="en-US" sz="1200" dirty="0">
+                <a:latin typeface="Courier New"/>
+                <a:cs typeface="Courier New"/>
+              </a:rPr>
+              <a:t>	</a:t>
+            </a:r>
+            <a:r>
+              <a:rPr lang="en-US" sz="1200" b="1" dirty="0" smtClean="0">
+                <a:latin typeface="Courier New"/>
+                <a:cs typeface="Courier New"/>
+              </a:rPr>
+              <a:t>ON</a:t>
+            </a:r>
+            <a:r>
+              <a:rPr lang="en-US" sz="1200" dirty="0" smtClean="0">
+                <a:latin typeface="Courier New"/>
+                <a:cs typeface="Courier New"/>
+              </a:rPr>
+              <a:t> (Zagat, Zagat)</a:t>
+            </a:r>
+          </a:p>
+          <a:p>
+            <a:r>
+              <a:rPr lang="en-US" sz="1200" dirty="0">
+                <a:latin typeface="Courier New"/>
+                <a:cs typeface="Courier New"/>
+              </a:rPr>
+              <a:t>	</a:t>
+            </a:r>
+            <a:r>
+              <a:rPr lang="en-US" sz="1200" b="1" dirty="0" smtClean="0">
+                <a:latin typeface="Courier New"/>
+                <a:cs typeface="Courier New"/>
+              </a:rPr>
+              <a:t>WITH</a:t>
+            </a:r>
+            <a:r>
+              <a:rPr lang="en-US" sz="1200" dirty="0" smtClean="0">
+                <a:latin typeface="Courier New"/>
+                <a:cs typeface="Courier New"/>
+              </a:rPr>
+              <a:t> </a:t>
+            </a:r>
+            <a:r>
+              <a:rPr lang="en-US" sz="1200" dirty="0" err="1" smtClean="0">
+                <a:latin typeface="Courier New"/>
+                <a:cs typeface="Courier New"/>
+              </a:rPr>
+              <a:t>Jaccard</a:t>
+            </a:r>
+            <a:r>
+              <a:rPr lang="en-US" sz="1200" dirty="0" smtClean="0">
+                <a:latin typeface="Courier New"/>
+                <a:cs typeface="Courier New"/>
+              </a:rPr>
+              <a:t>, thresh=0.8</a:t>
+            </a:r>
+            <a:endParaRPr lang="en-US" sz="1200" dirty="0">
+              <a:latin typeface="Courier New"/>
+              <a:cs typeface="Courier New"/>
+            </a:endParaRPr>
+          </a:p>
+        </p:txBody>
+      </p:sp>
     </p:spTree>
     <p:extLst>
       <p:ext uri="{BB962C8B-B14F-4D97-AF65-F5344CB8AC3E}">

</xml_diff>